<commit_message>
debugged / rewrote study 1 model fitting
forensic_beads_splitTerm_study1_simplify.m
</commit_message>
<xml_diff>
--- a/forensic_beads_some_slides/forensic_beads.pptx
+++ b/forensic_beads_some_slides/forensic_beads.pptx
@@ -18,6 +18,17 @@
     <p:sldId id="266" r:id="rId12"/>
     <p:sldId id="268" r:id="rId13"/>
     <p:sldId id="267" r:id="rId14"/>
+    <p:sldId id="277" r:id="rId15"/>
+    <p:sldId id="274" r:id="rId16"/>
+    <p:sldId id="275" r:id="rId17"/>
+    <p:sldId id="276" r:id="rId18"/>
+    <p:sldId id="269" r:id="rId19"/>
+    <p:sldId id="270" r:id="rId20"/>
+    <p:sldId id="271" r:id="rId21"/>
+    <p:sldId id="272" r:id="rId22"/>
+    <p:sldId id="273" r:id="rId23"/>
+    <p:sldId id="279" r:id="rId24"/>
+    <p:sldId id="278" r:id="rId25"/>
   </p:sldIdLst>
   <p:sldSz cx="12192000" cy="6858000"/>
   <p:notesSz cx="6858000" cy="9144000"/>
@@ -140,6 +151,21 @@
             <p14:sldId id="267"/>
           </p14:sldIdLst>
         </p14:section>
+        <p14:section name="Untitled Section" id="{B77257C0-E363-4347-ACB1-E22816131E73}">
+          <p14:sldIdLst>
+            <p14:sldId id="277"/>
+            <p14:sldId id="274"/>
+            <p14:sldId id="275"/>
+            <p14:sldId id="276"/>
+            <p14:sldId id="269"/>
+            <p14:sldId id="270"/>
+            <p14:sldId id="271"/>
+            <p14:sldId id="272"/>
+            <p14:sldId id="273"/>
+            <p14:sldId id="279"/>
+            <p14:sldId id="278"/>
+          </p14:sldIdLst>
+        </p14:section>
       </p14:sectionLst>
     </p:ext>
     <p:ext uri="{EFAFB233-063F-42B5-8137-9DF3F51BA10A}">
@@ -280,7 +306,7 @@
           <a:p>
             <a:fld id="{2700C6BD-C0EF-422F-A3C6-08FCE5AFE907}" type="datetimeFigureOut">
               <a:rPr lang="en-GB" smtClean="0"/>
-              <a:t>16/09/2023</a:t>
+              <a:t>22/09/2023</a:t>
             </a:fld>
             <a:endParaRPr lang="en-GB"/>
           </a:p>
@@ -450,7 +476,7 @@
           <a:p>
             <a:fld id="{2700C6BD-C0EF-422F-A3C6-08FCE5AFE907}" type="datetimeFigureOut">
               <a:rPr lang="en-GB" smtClean="0"/>
-              <a:t>16/09/2023</a:t>
+              <a:t>22/09/2023</a:t>
             </a:fld>
             <a:endParaRPr lang="en-GB"/>
           </a:p>
@@ -630,7 +656,7 @@
           <a:p>
             <a:fld id="{2700C6BD-C0EF-422F-A3C6-08FCE5AFE907}" type="datetimeFigureOut">
               <a:rPr lang="en-GB" smtClean="0"/>
-              <a:t>16/09/2023</a:t>
+              <a:t>22/09/2023</a:t>
             </a:fld>
             <a:endParaRPr lang="en-GB"/>
           </a:p>
@@ -800,7 +826,7 @@
           <a:p>
             <a:fld id="{2700C6BD-C0EF-422F-A3C6-08FCE5AFE907}" type="datetimeFigureOut">
               <a:rPr lang="en-GB" smtClean="0"/>
-              <a:t>16/09/2023</a:t>
+              <a:t>22/09/2023</a:t>
             </a:fld>
             <a:endParaRPr lang="en-GB"/>
           </a:p>
@@ -1046,7 +1072,7 @@
           <a:p>
             <a:fld id="{2700C6BD-C0EF-422F-A3C6-08FCE5AFE907}" type="datetimeFigureOut">
               <a:rPr lang="en-GB" smtClean="0"/>
-              <a:t>16/09/2023</a:t>
+              <a:t>22/09/2023</a:t>
             </a:fld>
             <a:endParaRPr lang="en-GB"/>
           </a:p>
@@ -1278,7 +1304,7 @@
           <a:p>
             <a:fld id="{2700C6BD-C0EF-422F-A3C6-08FCE5AFE907}" type="datetimeFigureOut">
               <a:rPr lang="en-GB" smtClean="0"/>
-              <a:t>16/09/2023</a:t>
+              <a:t>22/09/2023</a:t>
             </a:fld>
             <a:endParaRPr lang="en-GB"/>
           </a:p>
@@ -1645,7 +1671,7 @@
           <a:p>
             <a:fld id="{2700C6BD-C0EF-422F-A3C6-08FCE5AFE907}" type="datetimeFigureOut">
               <a:rPr lang="en-GB" smtClean="0"/>
-              <a:t>16/09/2023</a:t>
+              <a:t>22/09/2023</a:t>
             </a:fld>
             <a:endParaRPr lang="en-GB"/>
           </a:p>
@@ -1763,7 +1789,7 @@
           <a:p>
             <a:fld id="{2700C6BD-C0EF-422F-A3C6-08FCE5AFE907}" type="datetimeFigureOut">
               <a:rPr lang="en-GB" smtClean="0"/>
-              <a:t>16/09/2023</a:t>
+              <a:t>22/09/2023</a:t>
             </a:fld>
             <a:endParaRPr lang="en-GB"/>
           </a:p>
@@ -1858,7 +1884,7 @@
           <a:p>
             <a:fld id="{2700C6BD-C0EF-422F-A3C6-08FCE5AFE907}" type="datetimeFigureOut">
               <a:rPr lang="en-GB" smtClean="0"/>
-              <a:t>16/09/2023</a:t>
+              <a:t>22/09/2023</a:t>
             </a:fld>
             <a:endParaRPr lang="en-GB"/>
           </a:p>
@@ -2135,7 +2161,7 @@
           <a:p>
             <a:fld id="{2700C6BD-C0EF-422F-A3C6-08FCE5AFE907}" type="datetimeFigureOut">
               <a:rPr lang="en-GB" smtClean="0"/>
-              <a:t>16/09/2023</a:t>
+              <a:t>22/09/2023</a:t>
             </a:fld>
             <a:endParaRPr lang="en-GB"/>
           </a:p>
@@ -2388,7 +2414,7 @@
           <a:p>
             <a:fld id="{2700C6BD-C0EF-422F-A3C6-08FCE5AFE907}" type="datetimeFigureOut">
               <a:rPr lang="en-GB" smtClean="0"/>
-              <a:t>16/09/2023</a:t>
+              <a:t>22/09/2023</a:t>
             </a:fld>
             <a:endParaRPr lang="en-GB"/>
           </a:p>
@@ -2601,7 +2627,7 @@
           <a:p>
             <a:fld id="{2700C6BD-C0EF-422F-A3C6-08FCE5AFE907}" type="datetimeFigureOut">
               <a:rPr lang="en-GB" smtClean="0"/>
-              <a:t>16/09/2023</a:t>
+              <a:t>22/09/2023</a:t>
             </a:fld>
             <a:endParaRPr lang="en-GB"/>
           </a:p>
@@ -3015,8 +3041,14 @@
           <p:nvPr/>
         </p:nvPicPr>
         <p:blipFill rotWithShape="1">
-          <a:blip r:embed="rId2"/>
-          <a:srcRect l="32222" t="13457" r="38333" b="42037"/>
+          <a:blip r:embed="rId2" cstate="email">
+            <a:extLst>
+              <a:ext uri="{28A0092B-C50C-407E-A947-70E740481C1C}">
+                <a14:useLocalDpi xmlns:a14="http://schemas.microsoft.com/office/drawing/2010/main"/>
+              </a:ext>
+            </a:extLst>
+          </a:blip>
+          <a:srcRect/>
           <a:stretch/>
         </p:blipFill>
         <p:spPr>
@@ -3038,8 +3070,14 @@
           <p:nvPr/>
         </p:nvPicPr>
         <p:blipFill rotWithShape="1">
-          <a:blip r:embed="rId3"/>
-          <a:srcRect l="32456" t="12963" r="37031" b="41913"/>
+          <a:blip r:embed="rId3" cstate="email">
+            <a:extLst>
+              <a:ext uri="{28A0092B-C50C-407E-A947-70E740481C1C}">
+                <a14:useLocalDpi xmlns:a14="http://schemas.microsoft.com/office/drawing/2010/main"/>
+              </a:ext>
+            </a:extLst>
+          </a:blip>
+          <a:srcRect/>
           <a:stretch/>
         </p:blipFill>
         <p:spPr>
@@ -3151,14 +3189,14 @@
           <p:nvPr/>
         </p:nvPicPr>
         <p:blipFill rotWithShape="1">
-          <a:blip r:embed="rId2">
+          <a:blip r:embed="rId2" cstate="email">
             <a:extLst>
               <a:ext uri="{28A0092B-C50C-407E-A947-70E740481C1C}">
-                <a14:useLocalDpi xmlns:a14="http://schemas.microsoft.com/office/drawing/2010/main" val="0"/>
+                <a14:useLocalDpi xmlns:a14="http://schemas.microsoft.com/office/drawing/2010/main"/>
               </a:ext>
             </a:extLst>
           </a:blip>
-          <a:srcRect t="10666" b="7777"/>
+          <a:srcRect/>
           <a:stretch/>
         </p:blipFill>
         <p:spPr>
@@ -3210,8 +3248,14 @@
           <p:nvPr/>
         </p:nvPicPr>
         <p:blipFill rotWithShape="1">
-          <a:blip r:embed="rId2"/>
-          <a:srcRect l="25625" t="33333" r="38125" b="20370"/>
+          <a:blip r:embed="rId2" cstate="email">
+            <a:extLst>
+              <a:ext uri="{28A0092B-C50C-407E-A947-70E740481C1C}">
+                <a14:useLocalDpi xmlns:a14="http://schemas.microsoft.com/office/drawing/2010/main"/>
+              </a:ext>
+            </a:extLst>
+          </a:blip>
+          <a:srcRect/>
           <a:stretch/>
         </p:blipFill>
         <p:spPr>
@@ -3511,8 +3555,14 @@
           <p:nvPr/>
         </p:nvPicPr>
         <p:blipFill rotWithShape="1">
-          <a:blip r:embed="rId2"/>
-          <a:srcRect l="32083" t="14196" r="32361" b="40124"/>
+          <a:blip r:embed="rId2" cstate="email">
+            <a:extLst>
+              <a:ext uri="{28A0092B-C50C-407E-A947-70E740481C1C}">
+                <a14:useLocalDpi xmlns:a14="http://schemas.microsoft.com/office/drawing/2010/main"/>
+              </a:ext>
+            </a:extLst>
+          </a:blip>
+          <a:srcRect/>
           <a:stretch/>
         </p:blipFill>
         <p:spPr>
@@ -3564,8 +3614,14 @@
           <p:nvPr/>
         </p:nvPicPr>
         <p:blipFill rotWithShape="1">
-          <a:blip r:embed="rId2"/>
-          <a:srcRect l="1944" t="13704" r="27917" b="38889"/>
+          <a:blip r:embed="rId2" cstate="email">
+            <a:extLst>
+              <a:ext uri="{28A0092B-C50C-407E-A947-70E740481C1C}">
+                <a14:useLocalDpi xmlns:a14="http://schemas.microsoft.com/office/drawing/2010/main"/>
+              </a:ext>
+            </a:extLst>
+          </a:blip>
+          <a:srcRect/>
           <a:stretch/>
         </p:blipFill>
         <p:spPr>
@@ -3610,6 +3666,917 @@
     <p:extLst>
       <p:ext uri="{BB962C8B-B14F-4D97-AF65-F5344CB8AC3E}">
         <p14:creationId xmlns:p14="http://schemas.microsoft.com/office/powerpoint/2010/main" val="3689666399"/>
+      </p:ext>
+    </p:extLst>
+  </p:cSld>
+  <p:clrMapOvr>
+    <a:masterClrMapping/>
+  </p:clrMapOvr>
+</p:sld>
+</file>
+
+<file path=ppt/slides/slide14.xml><?xml version="1.0" encoding="utf-8"?>
+<p:sld xmlns:a="http://schemas.openxmlformats.org/drawingml/2006/main" xmlns:r="http://schemas.openxmlformats.org/officeDocument/2006/relationships" xmlns:p="http://schemas.openxmlformats.org/presentationml/2006/main">
+  <p:cSld>
+    <p:spTree>
+      <p:nvGrpSpPr>
+        <p:cNvPr id="1" name=""/>
+        <p:cNvGrpSpPr/>
+        <p:nvPr/>
+      </p:nvGrpSpPr>
+      <p:grpSpPr>
+        <a:xfrm>
+          <a:off x="0" y="0"/>
+          <a:ext cx="0" cy="0"/>
+          <a:chOff x="0" y="0"/>
+          <a:chExt cx="0" cy="0"/>
+        </a:xfrm>
+      </p:grpSpPr>
+      <p:sp>
+        <p:nvSpPr>
+          <p:cNvPr id="4" name="TextBox 3"/>
+          <p:cNvSpPr txBox="1"/>
+          <p:nvPr/>
+        </p:nvSpPr>
+        <p:spPr>
+          <a:xfrm>
+            <a:off x="952500" y="609600"/>
+            <a:ext cx="4231928" cy="830997"/>
+          </a:xfrm>
+          <a:prstGeom prst="rect">
+            <a:avLst/>
+          </a:prstGeom>
+          <a:noFill/>
+        </p:spPr>
+        <p:txBody>
+          <a:bodyPr wrap="none" rtlCol="0">
+            <a:spAutoFit/>
+          </a:bodyPr>
+          <a:lstStyle/>
+          <a:p>
+            <a:r>
+              <a:rPr lang="en-GB" sz="4800" dirty="0" smtClean="0"/>
+              <a:t>Matteo meeting</a:t>
+            </a:r>
+            <a:endParaRPr lang="en-GB" sz="4800" dirty="0"/>
+          </a:p>
+        </p:txBody>
+      </p:sp>
+    </p:spTree>
+    <p:extLst>
+      <p:ext uri="{BB962C8B-B14F-4D97-AF65-F5344CB8AC3E}">
+        <p14:creationId xmlns:p14="http://schemas.microsoft.com/office/powerpoint/2010/main" val="2940468258"/>
+      </p:ext>
+    </p:extLst>
+  </p:cSld>
+  <p:clrMapOvr>
+    <a:masterClrMapping/>
+  </p:clrMapOvr>
+</p:sld>
+</file>
+
+<file path=ppt/slides/slide15.xml><?xml version="1.0" encoding="utf-8"?>
+<p:sld xmlns:a="http://schemas.openxmlformats.org/drawingml/2006/main" xmlns:r="http://schemas.openxmlformats.org/officeDocument/2006/relationships" xmlns:p="http://schemas.openxmlformats.org/presentationml/2006/main">
+  <p:cSld>
+    <p:spTree>
+      <p:nvGrpSpPr>
+        <p:cNvPr id="1" name=""/>
+        <p:cNvGrpSpPr/>
+        <p:nvPr/>
+      </p:nvGrpSpPr>
+      <p:grpSpPr>
+        <a:xfrm>
+          <a:off x="0" y="0"/>
+          <a:ext cx="0" cy="0"/>
+          <a:chOff x="0" y="0"/>
+          <a:chExt cx="0" cy="0"/>
+        </a:xfrm>
+      </p:grpSpPr>
+      <p:pic>
+        <p:nvPicPr>
+          <p:cNvPr id="4" name="Picture 3"/>
+          <p:cNvPicPr/>
+          <p:nvPr/>
+        </p:nvPicPr>
+        <p:blipFill rotWithShape="1">
+          <a:blip r:embed="rId2" cstate="email">
+            <a:extLst>
+              <a:ext uri="{28A0092B-C50C-407E-A947-70E740481C1C}">
+                <a14:useLocalDpi xmlns:a14="http://schemas.microsoft.com/office/drawing/2010/main"/>
+              </a:ext>
+            </a:extLst>
+          </a:blip>
+          <a:srcRect/>
+          <a:stretch/>
+        </p:blipFill>
+        <p:spPr bwMode="auto">
+          <a:xfrm>
+            <a:off x="105727" y="657860"/>
+            <a:ext cx="5630545" cy="2086610"/>
+          </a:xfrm>
+          <a:prstGeom prst="rect">
+            <a:avLst/>
+          </a:prstGeom>
+          <a:ln>
+            <a:noFill/>
+          </a:ln>
+          <a:extLst>
+            <a:ext uri="{53640926-AAD7-44D8-BBD7-CCE9431645EC}">
+              <a14:shadowObscured xmlns:a14="http://schemas.microsoft.com/office/drawing/2010/main"/>
+            </a:ext>
+          </a:extLst>
+        </p:spPr>
+      </p:pic>
+      <p:pic>
+        <p:nvPicPr>
+          <p:cNvPr id="5" name="Picture 4"/>
+          <p:cNvPicPr/>
+          <p:nvPr/>
+        </p:nvPicPr>
+        <p:blipFill rotWithShape="1">
+          <a:blip r:embed="rId3" cstate="email">
+            <a:extLst>
+              <a:ext uri="{28A0092B-C50C-407E-A947-70E740481C1C}">
+                <a14:useLocalDpi xmlns:a14="http://schemas.microsoft.com/office/drawing/2010/main"/>
+              </a:ext>
+            </a:extLst>
+          </a:blip>
+          <a:srcRect/>
+          <a:stretch/>
+        </p:blipFill>
+        <p:spPr bwMode="auto">
+          <a:xfrm>
+            <a:off x="6100445" y="657860"/>
+            <a:ext cx="5731510" cy="2202180"/>
+          </a:xfrm>
+          <a:prstGeom prst="rect">
+            <a:avLst/>
+          </a:prstGeom>
+          <a:ln>
+            <a:noFill/>
+          </a:ln>
+          <a:extLst>
+            <a:ext uri="{53640926-AAD7-44D8-BBD7-CCE9431645EC}">
+              <a14:shadowObscured xmlns:a14="http://schemas.microsoft.com/office/drawing/2010/main"/>
+            </a:ext>
+          </a:extLst>
+        </p:spPr>
+      </p:pic>
+      <p:sp>
+        <p:nvSpPr>
+          <p:cNvPr id="6" name="TextBox 5"/>
+          <p:cNvSpPr txBox="1"/>
+          <p:nvPr/>
+        </p:nvSpPr>
+        <p:spPr>
+          <a:xfrm>
+            <a:off x="2478409" y="76200"/>
+            <a:ext cx="885179" cy="369332"/>
+          </a:xfrm>
+          <a:prstGeom prst="rect">
+            <a:avLst/>
+          </a:prstGeom>
+          <a:noFill/>
+        </p:spPr>
+        <p:txBody>
+          <a:bodyPr wrap="none" rtlCol="0">
+            <a:spAutoFit/>
+          </a:bodyPr>
+          <a:lstStyle/>
+          <a:p>
+            <a:r>
+              <a:rPr lang="en-GB" dirty="0" smtClean="0"/>
+              <a:t>Study 1</a:t>
+            </a:r>
+            <a:endParaRPr lang="en-GB" dirty="0"/>
+          </a:p>
+        </p:txBody>
+      </p:sp>
+      <p:sp>
+        <p:nvSpPr>
+          <p:cNvPr id="7" name="TextBox 6"/>
+          <p:cNvSpPr txBox="1"/>
+          <p:nvPr/>
+        </p:nvSpPr>
+        <p:spPr>
+          <a:xfrm>
+            <a:off x="8597900" y="76200"/>
+            <a:ext cx="885179" cy="369332"/>
+          </a:xfrm>
+          <a:prstGeom prst="rect">
+            <a:avLst/>
+          </a:prstGeom>
+          <a:noFill/>
+        </p:spPr>
+        <p:txBody>
+          <a:bodyPr wrap="none" rtlCol="0">
+            <a:spAutoFit/>
+          </a:bodyPr>
+          <a:lstStyle/>
+          <a:p>
+            <a:r>
+              <a:rPr lang="en-GB" dirty="0" smtClean="0"/>
+              <a:t>Study 2</a:t>
+            </a:r>
+            <a:endParaRPr lang="en-GB" dirty="0"/>
+          </a:p>
+        </p:txBody>
+      </p:sp>
+      <p:pic>
+        <p:nvPicPr>
+          <p:cNvPr id="8" name="Picture 7"/>
+          <p:cNvPicPr>
+            <a:picLocks noChangeAspect="1"/>
+          </p:cNvPicPr>
+          <p:nvPr/>
+        </p:nvPicPr>
+        <p:blipFill rotWithShape="1">
+          <a:blip r:embed="rId4" cstate="email">
+            <a:extLst>
+              <a:ext uri="{28A0092B-C50C-407E-A947-70E740481C1C}">
+                <a14:useLocalDpi xmlns:a14="http://schemas.microsoft.com/office/drawing/2010/main"/>
+              </a:ext>
+            </a:extLst>
+          </a:blip>
+          <a:srcRect/>
+          <a:stretch/>
+        </p:blipFill>
+        <p:spPr>
+          <a:xfrm>
+            <a:off x="878840" y="3185398"/>
+            <a:ext cx="4417060" cy="3349942"/>
+          </a:xfrm>
+          <a:prstGeom prst="rect">
+            <a:avLst/>
+          </a:prstGeom>
+        </p:spPr>
+      </p:pic>
+      <p:pic>
+        <p:nvPicPr>
+          <p:cNvPr id="9" name="Picture 8"/>
+          <p:cNvPicPr>
+            <a:picLocks noChangeAspect="1"/>
+          </p:cNvPicPr>
+          <p:nvPr/>
+        </p:nvPicPr>
+        <p:blipFill rotWithShape="1">
+          <a:blip r:embed="rId5" cstate="email">
+            <a:extLst>
+              <a:ext uri="{28A0092B-C50C-407E-A947-70E740481C1C}">
+                <a14:useLocalDpi xmlns:a14="http://schemas.microsoft.com/office/drawing/2010/main"/>
+              </a:ext>
+            </a:extLst>
+          </a:blip>
+          <a:srcRect/>
+          <a:stretch/>
+        </p:blipFill>
+        <p:spPr>
+          <a:xfrm>
+            <a:off x="6701779" y="3072368"/>
+            <a:ext cx="4347221" cy="3339938"/>
+          </a:xfrm>
+          <a:prstGeom prst="rect">
+            <a:avLst/>
+          </a:prstGeom>
+        </p:spPr>
+      </p:pic>
+    </p:spTree>
+    <p:extLst>
+      <p:ext uri="{BB962C8B-B14F-4D97-AF65-F5344CB8AC3E}">
+        <p14:creationId xmlns:p14="http://schemas.microsoft.com/office/powerpoint/2010/main" val="2537274184"/>
+      </p:ext>
+    </p:extLst>
+  </p:cSld>
+  <p:clrMapOvr>
+    <a:masterClrMapping/>
+  </p:clrMapOvr>
+</p:sld>
+</file>
+
+<file path=ppt/slides/slide16.xml><?xml version="1.0" encoding="utf-8"?>
+<p:sld xmlns:a="http://schemas.openxmlformats.org/drawingml/2006/main" xmlns:r="http://schemas.openxmlformats.org/officeDocument/2006/relationships" xmlns:p="http://schemas.openxmlformats.org/presentationml/2006/main">
+  <p:cSld>
+    <p:spTree>
+      <p:nvGrpSpPr>
+        <p:cNvPr id="1" name=""/>
+        <p:cNvGrpSpPr/>
+        <p:nvPr/>
+      </p:nvGrpSpPr>
+      <p:grpSpPr>
+        <a:xfrm>
+          <a:off x="0" y="0"/>
+          <a:ext cx="0" cy="0"/>
+          <a:chOff x="0" y="0"/>
+          <a:chExt cx="0" cy="0"/>
+        </a:xfrm>
+      </p:grpSpPr>
+      <p:pic>
+        <p:nvPicPr>
+          <p:cNvPr id="4" name="Picture 3"/>
+          <p:cNvPicPr>
+            <a:picLocks noChangeAspect="1"/>
+          </p:cNvPicPr>
+          <p:nvPr/>
+        </p:nvPicPr>
+        <p:blipFill rotWithShape="1">
+          <a:blip r:embed="rId2" cstate="email">
+            <a:extLst>
+              <a:ext uri="{28A0092B-C50C-407E-A947-70E740481C1C}">
+                <a14:useLocalDpi xmlns:a14="http://schemas.microsoft.com/office/drawing/2010/main"/>
+              </a:ext>
+            </a:extLst>
+          </a:blip>
+          <a:srcRect/>
+          <a:stretch/>
+        </p:blipFill>
+        <p:spPr>
+          <a:xfrm>
+            <a:off x="381000" y="1695451"/>
+            <a:ext cx="5124450" cy="2971800"/>
+          </a:xfrm>
+          <a:prstGeom prst="rect">
+            <a:avLst/>
+          </a:prstGeom>
+        </p:spPr>
+      </p:pic>
+      <p:pic>
+        <p:nvPicPr>
+          <p:cNvPr id="5" name="Picture 4"/>
+          <p:cNvPicPr>
+            <a:picLocks noChangeAspect="1"/>
+          </p:cNvPicPr>
+          <p:nvPr/>
+        </p:nvPicPr>
+        <p:blipFill rotWithShape="1">
+          <a:blip r:embed="rId3" cstate="email">
+            <a:extLst>
+              <a:ext uri="{28A0092B-C50C-407E-A947-70E740481C1C}">
+                <a14:useLocalDpi xmlns:a14="http://schemas.microsoft.com/office/drawing/2010/main"/>
+              </a:ext>
+            </a:extLst>
+          </a:blip>
+          <a:srcRect/>
+          <a:stretch/>
+        </p:blipFill>
+        <p:spPr>
+          <a:xfrm>
+            <a:off x="6096000" y="1085850"/>
+            <a:ext cx="5734050" cy="4489569"/>
+          </a:xfrm>
+          <a:prstGeom prst="rect">
+            <a:avLst/>
+          </a:prstGeom>
+        </p:spPr>
+      </p:pic>
+      <p:sp>
+        <p:nvSpPr>
+          <p:cNvPr id="6" name="TextBox 5"/>
+          <p:cNvSpPr txBox="1"/>
+          <p:nvPr/>
+        </p:nvSpPr>
+        <p:spPr>
+          <a:xfrm>
+            <a:off x="114300" y="266700"/>
+            <a:ext cx="4806444" cy="369332"/>
+          </a:xfrm>
+          <a:prstGeom prst="rect">
+            <a:avLst/>
+          </a:prstGeom>
+          <a:noFill/>
+        </p:spPr>
+        <p:txBody>
+          <a:bodyPr wrap="none" rtlCol="0">
+            <a:spAutoFit/>
+          </a:bodyPr>
+          <a:lstStyle/>
+          <a:p>
+            <a:r>
+              <a:rPr lang="en-GB" dirty="0" smtClean="0"/>
+              <a:t>Study 1, prior (1), bias (3), noise (4), split (6) fixed</a:t>
+            </a:r>
+            <a:endParaRPr lang="en-GB" dirty="0"/>
+          </a:p>
+        </p:txBody>
+      </p:sp>
+    </p:spTree>
+    <p:extLst>
+      <p:ext uri="{BB962C8B-B14F-4D97-AF65-F5344CB8AC3E}">
+        <p14:creationId xmlns:p14="http://schemas.microsoft.com/office/powerpoint/2010/main" val="2925017722"/>
+      </p:ext>
+    </p:extLst>
+  </p:cSld>
+  <p:clrMapOvr>
+    <a:masterClrMapping/>
+  </p:clrMapOvr>
+</p:sld>
+</file>
+
+<file path=ppt/slides/slide17.xml><?xml version="1.0" encoding="utf-8"?>
+<p:sld xmlns:a="http://schemas.openxmlformats.org/drawingml/2006/main" xmlns:r="http://schemas.openxmlformats.org/officeDocument/2006/relationships" xmlns:p="http://schemas.openxmlformats.org/presentationml/2006/main">
+  <p:cSld>
+    <p:spTree>
+      <p:nvGrpSpPr>
+        <p:cNvPr id="1" name=""/>
+        <p:cNvGrpSpPr/>
+        <p:nvPr/>
+      </p:nvGrpSpPr>
+      <p:grpSpPr>
+        <a:xfrm>
+          <a:off x="0" y="0"/>
+          <a:ext cx="0" cy="0"/>
+          <a:chOff x="0" y="0"/>
+          <a:chExt cx="0" cy="0"/>
+        </a:xfrm>
+      </p:grpSpPr>
+      <p:pic>
+        <p:nvPicPr>
+          <p:cNvPr id="4" name="Picture 3"/>
+          <p:cNvPicPr>
+            <a:picLocks noChangeAspect="1"/>
+          </p:cNvPicPr>
+          <p:nvPr/>
+        </p:nvPicPr>
+        <p:blipFill rotWithShape="1">
+          <a:blip r:embed="rId2" cstate="email">
+            <a:extLst>
+              <a:ext uri="{28A0092B-C50C-407E-A947-70E740481C1C}">
+                <a14:useLocalDpi xmlns:a14="http://schemas.microsoft.com/office/drawing/2010/main"/>
+              </a:ext>
+            </a:extLst>
+          </a:blip>
+          <a:srcRect/>
+          <a:stretch/>
+        </p:blipFill>
+        <p:spPr>
+          <a:xfrm>
+            <a:off x="114300" y="1790700"/>
+            <a:ext cx="5710507" cy="2952750"/>
+          </a:xfrm>
+          <a:prstGeom prst="rect">
+            <a:avLst/>
+          </a:prstGeom>
+        </p:spPr>
+      </p:pic>
+      <p:sp>
+        <p:nvSpPr>
+          <p:cNvPr id="5" name="TextBox 4"/>
+          <p:cNvSpPr txBox="1"/>
+          <p:nvPr/>
+        </p:nvSpPr>
+        <p:spPr>
+          <a:xfrm>
+            <a:off x="114300" y="266700"/>
+            <a:ext cx="6298968" cy="369332"/>
+          </a:xfrm>
+          <a:prstGeom prst="rect">
+            <a:avLst/>
+          </a:prstGeom>
+          <a:noFill/>
+        </p:spPr>
+        <p:txBody>
+          <a:bodyPr wrap="none" rtlCol="0">
+            <a:spAutoFit/>
+          </a:bodyPr>
+          <a:lstStyle/>
+          <a:p>
+            <a:r>
+              <a:rPr lang="en-GB" dirty="0" smtClean="0"/>
+              <a:t>Study 1, priors for different suspects (1 and 2), bias (4), noise (5)</a:t>
+            </a:r>
+            <a:endParaRPr lang="en-GB" dirty="0"/>
+          </a:p>
+        </p:txBody>
+      </p:sp>
+      <p:pic>
+        <p:nvPicPr>
+          <p:cNvPr id="6" name="Picture 5"/>
+          <p:cNvPicPr>
+            <a:picLocks noChangeAspect="1"/>
+          </p:cNvPicPr>
+          <p:nvPr/>
+        </p:nvPicPr>
+        <p:blipFill rotWithShape="1">
+          <a:blip r:embed="rId3" cstate="email">
+            <a:extLst>
+              <a:ext uri="{28A0092B-C50C-407E-A947-70E740481C1C}">
+                <a14:useLocalDpi xmlns:a14="http://schemas.microsoft.com/office/drawing/2010/main"/>
+              </a:ext>
+            </a:extLst>
+          </a:blip>
+          <a:srcRect/>
+          <a:stretch/>
+        </p:blipFill>
+        <p:spPr>
+          <a:xfrm>
+            <a:off x="6000750" y="952500"/>
+            <a:ext cx="6191250" cy="4762500"/>
+          </a:xfrm>
+          <a:prstGeom prst="rect">
+            <a:avLst/>
+          </a:prstGeom>
+        </p:spPr>
+      </p:pic>
+      <p:sp>
+        <p:nvSpPr>
+          <p:cNvPr id="7" name="TextBox 6"/>
+          <p:cNvSpPr txBox="1"/>
+          <p:nvPr/>
+        </p:nvSpPr>
+        <p:spPr>
+          <a:xfrm>
+            <a:off x="6648450" y="636032"/>
+            <a:ext cx="1830950" cy="369332"/>
+          </a:xfrm>
+          <a:prstGeom prst="rect">
+            <a:avLst/>
+          </a:prstGeom>
+          <a:noFill/>
+        </p:spPr>
+        <p:txBody>
+          <a:bodyPr wrap="none" rtlCol="0">
+            <a:spAutoFit/>
+          </a:bodyPr>
+          <a:lstStyle/>
+          <a:p>
+            <a:r>
+              <a:rPr lang="en-GB" dirty="0" smtClean="0"/>
+              <a:t>Suspect 0 (males)</a:t>
+            </a:r>
+            <a:endParaRPr lang="en-GB" dirty="0"/>
+          </a:p>
+        </p:txBody>
+      </p:sp>
+      <p:sp>
+        <p:nvSpPr>
+          <p:cNvPr id="8" name="TextBox 7"/>
+          <p:cNvSpPr txBox="1"/>
+          <p:nvPr/>
+        </p:nvSpPr>
+        <p:spPr>
+          <a:xfrm>
+            <a:off x="9658350" y="636032"/>
+            <a:ext cx="2011128" cy="369332"/>
+          </a:xfrm>
+          <a:prstGeom prst="rect">
+            <a:avLst/>
+          </a:prstGeom>
+          <a:noFill/>
+        </p:spPr>
+        <p:txBody>
+          <a:bodyPr wrap="none" rtlCol="0">
+            <a:spAutoFit/>
+          </a:bodyPr>
+          <a:lstStyle/>
+          <a:p>
+            <a:r>
+              <a:rPr lang="en-GB" dirty="0" smtClean="0"/>
+              <a:t>Suspect 1 (females)</a:t>
+            </a:r>
+            <a:endParaRPr lang="en-GB" dirty="0"/>
+          </a:p>
+        </p:txBody>
+      </p:sp>
+    </p:spTree>
+    <p:extLst>
+      <p:ext uri="{BB962C8B-B14F-4D97-AF65-F5344CB8AC3E}">
+        <p14:creationId xmlns:p14="http://schemas.microsoft.com/office/powerpoint/2010/main" val="1498643701"/>
+      </p:ext>
+    </p:extLst>
+  </p:cSld>
+  <p:clrMapOvr>
+    <a:masterClrMapping/>
+  </p:clrMapOvr>
+</p:sld>
+</file>
+
+<file path=ppt/slides/slide18.xml><?xml version="1.0" encoding="utf-8"?>
+<p:sld xmlns:a="http://schemas.openxmlformats.org/drawingml/2006/main" xmlns:r="http://schemas.openxmlformats.org/officeDocument/2006/relationships" xmlns:p="http://schemas.openxmlformats.org/presentationml/2006/main">
+  <p:cSld>
+    <p:spTree>
+      <p:nvGrpSpPr>
+        <p:cNvPr id="1" name=""/>
+        <p:cNvGrpSpPr/>
+        <p:nvPr/>
+      </p:nvGrpSpPr>
+      <p:grpSpPr>
+        <a:xfrm>
+          <a:off x="0" y="0"/>
+          <a:ext cx="0" cy="0"/>
+          <a:chOff x="0" y="0"/>
+          <a:chExt cx="0" cy="0"/>
+        </a:xfrm>
+      </p:grpSpPr>
+      <p:pic>
+        <p:nvPicPr>
+          <p:cNvPr id="4" name="Picture 3"/>
+          <p:cNvPicPr/>
+          <p:nvPr/>
+        </p:nvPicPr>
+        <p:blipFill rotWithShape="1">
+          <a:blip r:embed="rId2" cstate="email">
+            <a:extLst>
+              <a:ext uri="{28A0092B-C50C-407E-A947-70E740481C1C}">
+                <a14:useLocalDpi xmlns:a14="http://schemas.microsoft.com/office/drawing/2010/main"/>
+              </a:ext>
+            </a:extLst>
+          </a:blip>
+          <a:srcRect/>
+          <a:stretch/>
+        </p:blipFill>
+        <p:spPr bwMode="auto">
+          <a:xfrm>
+            <a:off x="5654521" y="247650"/>
+            <a:ext cx="4518179" cy="3200400"/>
+          </a:xfrm>
+          <a:prstGeom prst="rect">
+            <a:avLst/>
+          </a:prstGeom>
+          <a:ln>
+            <a:noFill/>
+          </a:ln>
+          <a:extLst>
+            <a:ext uri="{53640926-AAD7-44D8-BBD7-CCE9431645EC}">
+              <a14:shadowObscured xmlns:a14="http://schemas.microsoft.com/office/drawing/2010/main"/>
+            </a:ext>
+          </a:extLst>
+        </p:spPr>
+      </p:pic>
+      <p:pic>
+        <p:nvPicPr>
+          <p:cNvPr id="5" name="Picture 4"/>
+          <p:cNvPicPr/>
+          <p:nvPr/>
+        </p:nvPicPr>
+        <p:blipFill rotWithShape="1">
+          <a:blip r:embed="rId3" cstate="email">
+            <a:extLst>
+              <a:ext uri="{28A0092B-C50C-407E-A947-70E740481C1C}">
+                <a14:useLocalDpi xmlns:a14="http://schemas.microsoft.com/office/drawing/2010/main"/>
+              </a:ext>
+            </a:extLst>
+          </a:blip>
+          <a:srcRect/>
+          <a:stretch/>
+        </p:blipFill>
+        <p:spPr bwMode="auto">
+          <a:xfrm>
+            <a:off x="377672" y="1028700"/>
+            <a:ext cx="4974771" cy="3733800"/>
+          </a:xfrm>
+          <a:prstGeom prst="rect">
+            <a:avLst/>
+          </a:prstGeom>
+          <a:ln>
+            <a:noFill/>
+          </a:ln>
+          <a:extLst>
+            <a:ext uri="{53640926-AAD7-44D8-BBD7-CCE9431645EC}">
+              <a14:shadowObscured xmlns:a14="http://schemas.microsoft.com/office/drawing/2010/main"/>
+            </a:ext>
+          </a:extLst>
+        </p:spPr>
+      </p:pic>
+      <p:pic>
+        <p:nvPicPr>
+          <p:cNvPr id="7" name="Picture 6"/>
+          <p:cNvPicPr>
+            <a:picLocks noChangeAspect="1"/>
+          </p:cNvPicPr>
+          <p:nvPr/>
+        </p:nvPicPr>
+        <p:blipFill rotWithShape="1">
+          <a:blip r:embed="rId4" cstate="email">
+            <a:extLst>
+              <a:ext uri="{28A0092B-C50C-407E-A947-70E740481C1C}">
+                <a14:useLocalDpi xmlns:a14="http://schemas.microsoft.com/office/drawing/2010/main"/>
+              </a:ext>
+            </a:extLst>
+          </a:blip>
+          <a:srcRect/>
+          <a:stretch/>
+        </p:blipFill>
+        <p:spPr>
+          <a:xfrm>
+            <a:off x="5654521" y="3800631"/>
+            <a:ext cx="4039207" cy="3057369"/>
+          </a:xfrm>
+          <a:prstGeom prst="rect">
+            <a:avLst/>
+          </a:prstGeom>
+        </p:spPr>
+      </p:pic>
+    </p:spTree>
+    <p:extLst>
+      <p:ext uri="{BB962C8B-B14F-4D97-AF65-F5344CB8AC3E}">
+        <p14:creationId xmlns:p14="http://schemas.microsoft.com/office/powerpoint/2010/main" val="3990752115"/>
+      </p:ext>
+    </p:extLst>
+  </p:cSld>
+  <p:clrMapOvr>
+    <a:masterClrMapping/>
+  </p:clrMapOvr>
+</p:sld>
+</file>
+
+<file path=ppt/slides/slide19.xml><?xml version="1.0" encoding="utf-8"?>
+<p:sld xmlns:a="http://schemas.openxmlformats.org/drawingml/2006/main" xmlns:r="http://schemas.openxmlformats.org/officeDocument/2006/relationships" xmlns:p="http://schemas.openxmlformats.org/presentationml/2006/main">
+  <p:cSld>
+    <p:spTree>
+      <p:nvGrpSpPr>
+        <p:cNvPr id="1" name=""/>
+        <p:cNvGrpSpPr/>
+        <p:nvPr/>
+      </p:nvGrpSpPr>
+      <p:grpSpPr>
+        <a:xfrm>
+          <a:off x="0" y="0"/>
+          <a:ext cx="0" cy="0"/>
+          <a:chOff x="0" y="0"/>
+          <a:chExt cx="0" cy="0"/>
+        </a:xfrm>
+      </p:grpSpPr>
+      <p:pic>
+        <p:nvPicPr>
+          <p:cNvPr id="4" name="Picture 3"/>
+          <p:cNvPicPr>
+            <a:picLocks noChangeAspect="1"/>
+          </p:cNvPicPr>
+          <p:nvPr/>
+        </p:nvPicPr>
+        <p:blipFill>
+          <a:blip r:embed="rId2" cstate="email">
+            <a:extLst>
+              <a:ext uri="{28A0092B-C50C-407E-A947-70E740481C1C}">
+                <a14:useLocalDpi xmlns:a14="http://schemas.microsoft.com/office/drawing/2010/main"/>
+              </a:ext>
+            </a:extLst>
+          </a:blip>
+          <a:stretch>
+            <a:fillRect/>
+          </a:stretch>
+        </p:blipFill>
+        <p:spPr>
+          <a:xfrm>
+            <a:off x="201655" y="1276350"/>
+            <a:ext cx="3551195" cy="2786322"/>
+          </a:xfrm>
+          <a:prstGeom prst="rect">
+            <a:avLst/>
+          </a:prstGeom>
+        </p:spPr>
+      </p:pic>
+      <p:pic>
+        <p:nvPicPr>
+          <p:cNvPr id="5" name="Picture 4"/>
+          <p:cNvPicPr>
+            <a:picLocks noChangeAspect="1"/>
+          </p:cNvPicPr>
+          <p:nvPr/>
+        </p:nvPicPr>
+        <p:blipFill rotWithShape="1">
+          <a:blip r:embed="rId3" cstate="email">
+            <a:extLst>
+              <a:ext uri="{28A0092B-C50C-407E-A947-70E740481C1C}">
+                <a14:useLocalDpi xmlns:a14="http://schemas.microsoft.com/office/drawing/2010/main"/>
+              </a:ext>
+            </a:extLst>
+          </a:blip>
+          <a:srcRect/>
+          <a:stretch/>
+        </p:blipFill>
+        <p:spPr>
+          <a:xfrm>
+            <a:off x="4457700" y="1276350"/>
+            <a:ext cx="3562122" cy="2786322"/>
+          </a:xfrm>
+          <a:prstGeom prst="rect">
+            <a:avLst/>
+          </a:prstGeom>
+        </p:spPr>
+      </p:pic>
+      <p:pic>
+        <p:nvPicPr>
+          <p:cNvPr id="6" name="Picture 5"/>
+          <p:cNvPicPr>
+            <a:picLocks noChangeAspect="1"/>
+          </p:cNvPicPr>
+          <p:nvPr/>
+        </p:nvPicPr>
+        <p:blipFill rotWithShape="1">
+          <a:blip r:embed="rId4" cstate="email">
+            <a:extLst>
+              <a:ext uri="{28A0092B-C50C-407E-A947-70E740481C1C}">
+                <a14:useLocalDpi xmlns:a14="http://schemas.microsoft.com/office/drawing/2010/main"/>
+              </a:ext>
+            </a:extLst>
+          </a:blip>
+          <a:srcRect/>
+          <a:stretch/>
+        </p:blipFill>
+        <p:spPr>
+          <a:xfrm>
+            <a:off x="8419872" y="1398094"/>
+            <a:ext cx="3448278" cy="2664578"/>
+          </a:xfrm>
+          <a:prstGeom prst="rect">
+            <a:avLst/>
+          </a:prstGeom>
+        </p:spPr>
+      </p:pic>
+      <p:sp>
+        <p:nvSpPr>
+          <p:cNvPr id="7" name="TextBox 6"/>
+          <p:cNvSpPr txBox="1"/>
+          <p:nvPr/>
+        </p:nvSpPr>
+        <p:spPr>
+          <a:xfrm>
+            <a:off x="571500" y="647700"/>
+            <a:ext cx="1189749" cy="369332"/>
+          </a:xfrm>
+          <a:prstGeom prst="rect">
+            <a:avLst/>
+          </a:prstGeom>
+          <a:noFill/>
+        </p:spPr>
+        <p:txBody>
+          <a:bodyPr wrap="none" rtlCol="0">
+            <a:spAutoFit/>
+          </a:bodyPr>
+          <a:lstStyle/>
+          <a:p>
+            <a:r>
+              <a:rPr lang="en-GB" dirty="0" smtClean="0"/>
+              <a:t>60/40 split</a:t>
+            </a:r>
+            <a:endParaRPr lang="en-GB" dirty="0"/>
+          </a:p>
+        </p:txBody>
+      </p:sp>
+      <p:sp>
+        <p:nvSpPr>
+          <p:cNvPr id="8" name="TextBox 7"/>
+          <p:cNvSpPr txBox="1"/>
+          <p:nvPr/>
+        </p:nvSpPr>
+        <p:spPr>
+          <a:xfrm>
+            <a:off x="4781550" y="647700"/>
+            <a:ext cx="1189749" cy="369332"/>
+          </a:xfrm>
+          <a:prstGeom prst="rect">
+            <a:avLst/>
+          </a:prstGeom>
+          <a:noFill/>
+        </p:spPr>
+        <p:txBody>
+          <a:bodyPr wrap="none" rtlCol="0">
+            <a:spAutoFit/>
+          </a:bodyPr>
+          <a:lstStyle/>
+          <a:p>
+            <a:r>
+              <a:rPr lang="en-GB" dirty="0" smtClean="0"/>
+              <a:t>70/30 split</a:t>
+            </a:r>
+            <a:endParaRPr lang="en-GB" dirty="0"/>
+          </a:p>
+        </p:txBody>
+      </p:sp>
+      <p:sp>
+        <p:nvSpPr>
+          <p:cNvPr id="9" name="TextBox 8"/>
+          <p:cNvSpPr txBox="1"/>
+          <p:nvPr/>
+        </p:nvSpPr>
+        <p:spPr>
+          <a:xfrm>
+            <a:off x="8686800" y="647700"/>
+            <a:ext cx="1189749" cy="369332"/>
+          </a:xfrm>
+          <a:prstGeom prst="rect">
+            <a:avLst/>
+          </a:prstGeom>
+          <a:noFill/>
+        </p:spPr>
+        <p:txBody>
+          <a:bodyPr wrap="none" rtlCol="0">
+            <a:spAutoFit/>
+          </a:bodyPr>
+          <a:lstStyle/>
+          <a:p>
+            <a:r>
+              <a:rPr lang="en-GB" dirty="0" smtClean="0"/>
+              <a:t>80/20 split</a:t>
+            </a:r>
+            <a:endParaRPr lang="en-GB" dirty="0"/>
+          </a:p>
+        </p:txBody>
+      </p:sp>
+    </p:spTree>
+    <p:extLst>
+      <p:ext uri="{BB962C8B-B14F-4D97-AF65-F5344CB8AC3E}">
+        <p14:creationId xmlns:p14="http://schemas.microsoft.com/office/powerpoint/2010/main" val="2539455216"/>
       </p:ext>
     </p:extLst>
   </p:cSld>
@@ -3645,14 +4612,14 @@
           <p:nvPr/>
         </p:nvPicPr>
         <p:blipFill rotWithShape="1">
-          <a:blip r:embed="rId2">
+          <a:blip r:embed="rId2" cstate="email">
             <a:extLst>
               <a:ext uri="{28A0092B-C50C-407E-A947-70E740481C1C}">
-                <a14:useLocalDpi xmlns:a14="http://schemas.microsoft.com/office/drawing/2010/main" val="0"/>
+                <a14:useLocalDpi xmlns:a14="http://schemas.microsoft.com/office/drawing/2010/main"/>
               </a:ext>
             </a:extLst>
           </a:blip>
-          <a:srcRect l="1913" t="9275" r="3826" b="14976"/>
+          <a:srcRect/>
           <a:stretch/>
         </p:blipFill>
         <p:spPr>
@@ -3669,6 +4636,541 @@
     <p:extLst>
       <p:ext uri="{BB962C8B-B14F-4D97-AF65-F5344CB8AC3E}">
         <p14:creationId xmlns:p14="http://schemas.microsoft.com/office/powerpoint/2010/main" val="1773595012"/>
+      </p:ext>
+    </p:extLst>
+  </p:cSld>
+  <p:clrMapOvr>
+    <a:masterClrMapping/>
+  </p:clrMapOvr>
+</p:sld>
+</file>
+
+<file path=ppt/slides/slide20.xml><?xml version="1.0" encoding="utf-8"?>
+<p:sld xmlns:a="http://schemas.openxmlformats.org/drawingml/2006/main" xmlns:r="http://schemas.openxmlformats.org/officeDocument/2006/relationships" xmlns:p="http://schemas.openxmlformats.org/presentationml/2006/main">
+  <p:cSld>
+    <p:spTree>
+      <p:nvGrpSpPr>
+        <p:cNvPr id="1" name=""/>
+        <p:cNvGrpSpPr/>
+        <p:nvPr/>
+      </p:nvGrpSpPr>
+      <p:grpSpPr>
+        <a:xfrm>
+          <a:off x="0" y="0"/>
+          <a:ext cx="0" cy="0"/>
+          <a:chOff x="0" y="0"/>
+          <a:chExt cx="0" cy="0"/>
+        </a:xfrm>
+      </p:grpSpPr>
+      <p:pic>
+        <p:nvPicPr>
+          <p:cNvPr id="4" name="Picture 3"/>
+          <p:cNvPicPr>
+            <a:picLocks noChangeAspect="1"/>
+          </p:cNvPicPr>
+          <p:nvPr/>
+        </p:nvPicPr>
+        <p:blipFill rotWithShape="1">
+          <a:blip r:embed="rId2" cstate="email">
+            <a:extLst>
+              <a:ext uri="{28A0092B-C50C-407E-A947-70E740481C1C}">
+                <a14:useLocalDpi xmlns:a14="http://schemas.microsoft.com/office/drawing/2010/main"/>
+              </a:ext>
+            </a:extLst>
+          </a:blip>
+          <a:srcRect/>
+          <a:stretch/>
+        </p:blipFill>
+        <p:spPr>
+          <a:xfrm>
+            <a:off x="6680660" y="1057275"/>
+            <a:ext cx="5511340" cy="4362450"/>
+          </a:xfrm>
+          <a:prstGeom prst="rect">
+            <a:avLst/>
+          </a:prstGeom>
+        </p:spPr>
+      </p:pic>
+      <p:pic>
+        <p:nvPicPr>
+          <p:cNvPr id="5" name="Picture 4"/>
+          <p:cNvPicPr>
+            <a:picLocks noChangeAspect="1"/>
+          </p:cNvPicPr>
+          <p:nvPr/>
+        </p:nvPicPr>
+        <p:blipFill rotWithShape="1">
+          <a:blip r:embed="rId3" cstate="email">
+            <a:extLst>
+              <a:ext uri="{28A0092B-C50C-407E-A947-70E740481C1C}">
+                <a14:useLocalDpi xmlns:a14="http://schemas.microsoft.com/office/drawing/2010/main"/>
+              </a:ext>
+            </a:extLst>
+          </a:blip>
+          <a:srcRect/>
+          <a:stretch/>
+        </p:blipFill>
+        <p:spPr>
+          <a:xfrm>
+            <a:off x="133350" y="1800225"/>
+            <a:ext cx="6555512" cy="2352675"/>
+          </a:xfrm>
+          <a:prstGeom prst="rect">
+            <a:avLst/>
+          </a:prstGeom>
+        </p:spPr>
+      </p:pic>
+      <p:sp>
+        <p:nvSpPr>
+          <p:cNvPr id="6" name="TextBox 5"/>
+          <p:cNvSpPr txBox="1"/>
+          <p:nvPr/>
+        </p:nvSpPr>
+        <p:spPr>
+          <a:xfrm>
+            <a:off x="133350" y="209550"/>
+            <a:ext cx="6809941" cy="369332"/>
+          </a:xfrm>
+          <a:prstGeom prst="rect">
+            <a:avLst/>
+          </a:prstGeom>
+          <a:noFill/>
+        </p:spPr>
+        <p:txBody>
+          <a:bodyPr wrap="none" rtlCol="0">
+            <a:spAutoFit/>
+          </a:bodyPr>
+          <a:lstStyle/>
+          <a:p>
+            <a:r>
+              <a:rPr lang="en-GB" dirty="0" smtClean="0"/>
+              <a:t>Study 1, prior (1), bias (3), noise (4) all fixed but split (6) free parameter</a:t>
+            </a:r>
+            <a:endParaRPr lang="en-GB" dirty="0"/>
+          </a:p>
+        </p:txBody>
+      </p:sp>
+      <p:sp>
+        <p:nvSpPr>
+          <p:cNvPr id="7" name="TextBox 6"/>
+          <p:cNvSpPr txBox="1"/>
+          <p:nvPr/>
+        </p:nvSpPr>
+        <p:spPr>
+          <a:xfrm>
+            <a:off x="133350" y="4249519"/>
+            <a:ext cx="2189830" cy="646331"/>
+          </a:xfrm>
+          <a:prstGeom prst="rect">
+            <a:avLst/>
+          </a:prstGeom>
+          <a:noFill/>
+        </p:spPr>
+        <p:txBody>
+          <a:bodyPr wrap="none" rtlCol="0">
+            <a:spAutoFit/>
+          </a:bodyPr>
+          <a:lstStyle/>
+          <a:p>
+            <a:r>
+              <a:rPr lang="en-GB" dirty="0" smtClean="0"/>
+              <a:t>Blue atheist suspect</a:t>
+            </a:r>
+          </a:p>
+          <a:p>
+            <a:r>
+              <a:rPr lang="en-GB" dirty="0" smtClean="0"/>
+              <a:t>Red Christian suspect</a:t>
+            </a:r>
+            <a:endParaRPr lang="en-GB" dirty="0"/>
+          </a:p>
+        </p:txBody>
+      </p:sp>
+    </p:spTree>
+    <p:extLst>
+      <p:ext uri="{BB962C8B-B14F-4D97-AF65-F5344CB8AC3E}">
+        <p14:creationId xmlns:p14="http://schemas.microsoft.com/office/powerpoint/2010/main" val="2872648726"/>
+      </p:ext>
+    </p:extLst>
+  </p:cSld>
+  <p:clrMapOvr>
+    <a:masterClrMapping/>
+  </p:clrMapOvr>
+</p:sld>
+</file>
+
+<file path=ppt/slides/slide21.xml><?xml version="1.0" encoding="utf-8"?>
+<p:sld xmlns:a="http://schemas.openxmlformats.org/drawingml/2006/main" xmlns:r="http://schemas.openxmlformats.org/officeDocument/2006/relationships" xmlns:p="http://schemas.openxmlformats.org/presentationml/2006/main">
+  <p:cSld>
+    <p:spTree>
+      <p:nvGrpSpPr>
+        <p:cNvPr id="1" name=""/>
+        <p:cNvGrpSpPr/>
+        <p:nvPr/>
+      </p:nvGrpSpPr>
+      <p:grpSpPr>
+        <a:xfrm>
+          <a:off x="0" y="0"/>
+          <a:ext cx="0" cy="0"/>
+          <a:chOff x="0" y="0"/>
+          <a:chExt cx="0" cy="0"/>
+        </a:xfrm>
+      </p:grpSpPr>
+      <p:pic>
+        <p:nvPicPr>
+          <p:cNvPr id="4" name="Picture 3"/>
+          <p:cNvPicPr>
+            <a:picLocks noChangeAspect="1"/>
+          </p:cNvPicPr>
+          <p:nvPr/>
+        </p:nvPicPr>
+        <p:blipFill rotWithShape="1">
+          <a:blip r:embed="rId2" cstate="email">
+            <a:extLst>
+              <a:ext uri="{28A0092B-C50C-407E-A947-70E740481C1C}">
+                <a14:useLocalDpi xmlns:a14="http://schemas.microsoft.com/office/drawing/2010/main"/>
+              </a:ext>
+            </a:extLst>
+          </a:blip>
+          <a:srcRect/>
+          <a:stretch/>
+        </p:blipFill>
+        <p:spPr>
+          <a:xfrm>
+            <a:off x="7467600" y="1407062"/>
+            <a:ext cx="4572000" cy="3587262"/>
+          </a:xfrm>
+          <a:prstGeom prst="rect">
+            <a:avLst/>
+          </a:prstGeom>
+        </p:spPr>
+      </p:pic>
+      <p:pic>
+        <p:nvPicPr>
+          <p:cNvPr id="6" name="Picture 5"/>
+          <p:cNvPicPr>
+            <a:picLocks noChangeAspect="1"/>
+          </p:cNvPicPr>
+          <p:nvPr/>
+        </p:nvPicPr>
+        <p:blipFill rotWithShape="1">
+          <a:blip r:embed="rId3" cstate="email">
+            <a:extLst>
+              <a:ext uri="{28A0092B-C50C-407E-A947-70E740481C1C}">
+                <a14:useLocalDpi xmlns:a14="http://schemas.microsoft.com/office/drawing/2010/main"/>
+              </a:ext>
+            </a:extLst>
+          </a:blip>
+          <a:srcRect/>
+          <a:stretch/>
+        </p:blipFill>
+        <p:spPr>
+          <a:xfrm>
+            <a:off x="323850" y="1309174"/>
+            <a:ext cx="6982389" cy="3685150"/>
+          </a:xfrm>
+          <a:prstGeom prst="rect">
+            <a:avLst/>
+          </a:prstGeom>
+        </p:spPr>
+      </p:pic>
+      <p:sp>
+        <p:nvSpPr>
+          <p:cNvPr id="7" name="TextBox 6"/>
+          <p:cNvSpPr txBox="1"/>
+          <p:nvPr/>
+        </p:nvSpPr>
+        <p:spPr>
+          <a:xfrm>
+            <a:off x="133350" y="209550"/>
+            <a:ext cx="6125972" cy="369332"/>
+          </a:xfrm>
+          <a:prstGeom prst="rect">
+            <a:avLst/>
+          </a:prstGeom>
+          <a:noFill/>
+        </p:spPr>
+        <p:txBody>
+          <a:bodyPr wrap="none" rtlCol="0">
+            <a:spAutoFit/>
+          </a:bodyPr>
+          <a:lstStyle/>
+          <a:p>
+            <a:r>
+              <a:rPr lang="en-GB" dirty="0" smtClean="0"/>
+              <a:t>Study 1, prior (1), bias (3), noise (4), split (6) all free parameters</a:t>
+            </a:r>
+            <a:endParaRPr lang="en-GB" dirty="0"/>
+          </a:p>
+        </p:txBody>
+      </p:sp>
+    </p:spTree>
+    <p:extLst>
+      <p:ext uri="{BB962C8B-B14F-4D97-AF65-F5344CB8AC3E}">
+        <p14:creationId xmlns:p14="http://schemas.microsoft.com/office/powerpoint/2010/main" val="1003425644"/>
+      </p:ext>
+    </p:extLst>
+  </p:cSld>
+  <p:clrMapOvr>
+    <a:masterClrMapping/>
+  </p:clrMapOvr>
+</p:sld>
+</file>
+
+<file path=ppt/slides/slide22.xml><?xml version="1.0" encoding="utf-8"?>
+<p:sld xmlns:a="http://schemas.openxmlformats.org/drawingml/2006/main" xmlns:r="http://schemas.openxmlformats.org/officeDocument/2006/relationships" xmlns:p="http://schemas.openxmlformats.org/presentationml/2006/main">
+  <p:cSld>
+    <p:spTree>
+      <p:nvGrpSpPr>
+        <p:cNvPr id="1" name=""/>
+        <p:cNvGrpSpPr/>
+        <p:nvPr/>
+      </p:nvGrpSpPr>
+      <p:grpSpPr>
+        <a:xfrm>
+          <a:off x="0" y="0"/>
+          <a:ext cx="0" cy="0"/>
+          <a:chOff x="0" y="0"/>
+          <a:chExt cx="0" cy="0"/>
+        </a:xfrm>
+      </p:grpSpPr>
+      <p:pic>
+        <p:nvPicPr>
+          <p:cNvPr id="4" name="Picture 3"/>
+          <p:cNvPicPr>
+            <a:picLocks noChangeAspect="1"/>
+          </p:cNvPicPr>
+          <p:nvPr/>
+        </p:nvPicPr>
+        <p:blipFill rotWithShape="1">
+          <a:blip r:embed="rId2" cstate="email">
+            <a:extLst>
+              <a:ext uri="{28A0092B-C50C-407E-A947-70E740481C1C}">
+                <a14:useLocalDpi xmlns:a14="http://schemas.microsoft.com/office/drawing/2010/main"/>
+              </a:ext>
+            </a:extLst>
+          </a:blip>
+          <a:srcRect/>
+          <a:stretch/>
+        </p:blipFill>
+        <p:spPr>
+          <a:xfrm>
+            <a:off x="6731906" y="1352550"/>
+            <a:ext cx="5288643" cy="4038600"/>
+          </a:xfrm>
+          <a:prstGeom prst="rect">
+            <a:avLst/>
+          </a:prstGeom>
+        </p:spPr>
+      </p:pic>
+      <p:pic>
+        <p:nvPicPr>
+          <p:cNvPr id="5" name="Picture 4"/>
+          <p:cNvPicPr>
+            <a:picLocks noChangeAspect="1"/>
+          </p:cNvPicPr>
+          <p:nvPr/>
+        </p:nvPicPr>
+        <p:blipFill rotWithShape="1">
+          <a:blip r:embed="rId3" cstate="email">
+            <a:extLst>
+              <a:ext uri="{28A0092B-C50C-407E-A947-70E740481C1C}">
+                <a14:useLocalDpi xmlns:a14="http://schemas.microsoft.com/office/drawing/2010/main"/>
+              </a:ext>
+            </a:extLst>
+          </a:blip>
+          <a:srcRect/>
+          <a:stretch/>
+        </p:blipFill>
+        <p:spPr>
+          <a:xfrm>
+            <a:off x="111187" y="1562100"/>
+            <a:ext cx="6620719" cy="3352800"/>
+          </a:xfrm>
+          <a:prstGeom prst="rect">
+            <a:avLst/>
+          </a:prstGeom>
+        </p:spPr>
+      </p:pic>
+      <p:sp>
+        <p:nvSpPr>
+          <p:cNvPr id="6" name="TextBox 5"/>
+          <p:cNvSpPr txBox="1"/>
+          <p:nvPr/>
+        </p:nvSpPr>
+        <p:spPr>
+          <a:xfrm>
+            <a:off x="133350" y="209550"/>
+            <a:ext cx="7496796" cy="369332"/>
+          </a:xfrm>
+          <a:prstGeom prst="rect">
+            <a:avLst/>
+          </a:prstGeom>
+          <a:noFill/>
+        </p:spPr>
+        <p:txBody>
+          <a:bodyPr wrap="none" rtlCol="0">
+            <a:spAutoFit/>
+          </a:bodyPr>
+          <a:lstStyle/>
+          <a:p>
+            <a:r>
+              <a:rPr lang="en-GB" dirty="0" smtClean="0"/>
+              <a:t>Study 1, prior (1), bias (3), noise (4), interaction (5), split (6) all free parameters</a:t>
+            </a:r>
+            <a:endParaRPr lang="en-GB" dirty="0"/>
+          </a:p>
+        </p:txBody>
+      </p:sp>
+    </p:spTree>
+    <p:extLst>
+      <p:ext uri="{BB962C8B-B14F-4D97-AF65-F5344CB8AC3E}">
+        <p14:creationId xmlns:p14="http://schemas.microsoft.com/office/powerpoint/2010/main" val="1569052609"/>
+      </p:ext>
+    </p:extLst>
+  </p:cSld>
+  <p:clrMapOvr>
+    <a:masterClrMapping/>
+  </p:clrMapOvr>
+</p:sld>
+</file>
+
+<file path=ppt/slides/slide23.xml><?xml version="1.0" encoding="utf-8"?>
+<p:sld xmlns:a="http://schemas.openxmlformats.org/drawingml/2006/main" xmlns:r="http://schemas.openxmlformats.org/officeDocument/2006/relationships" xmlns:p="http://schemas.openxmlformats.org/presentationml/2006/main">
+  <p:cSld>
+    <p:spTree>
+      <p:nvGrpSpPr>
+        <p:cNvPr id="1" name=""/>
+        <p:cNvGrpSpPr/>
+        <p:nvPr/>
+      </p:nvGrpSpPr>
+      <p:grpSpPr>
+        <a:xfrm>
+          <a:off x="0" y="0"/>
+          <a:ext cx="0" cy="0"/>
+          <a:chOff x="0" y="0"/>
+          <a:chExt cx="0" cy="0"/>
+        </a:xfrm>
+      </p:grpSpPr>
+    </p:spTree>
+    <p:extLst>
+      <p:ext uri="{BB962C8B-B14F-4D97-AF65-F5344CB8AC3E}">
+        <p14:creationId xmlns:p14="http://schemas.microsoft.com/office/powerpoint/2010/main" val="2881667403"/>
+      </p:ext>
+    </p:extLst>
+  </p:cSld>
+  <p:clrMapOvr>
+    <a:masterClrMapping/>
+  </p:clrMapOvr>
+</p:sld>
+</file>
+
+<file path=ppt/slides/slide24.xml><?xml version="1.0" encoding="utf-8"?>
+<p:sld xmlns:a="http://schemas.openxmlformats.org/drawingml/2006/main" xmlns:r="http://schemas.openxmlformats.org/officeDocument/2006/relationships" xmlns:p="http://schemas.openxmlformats.org/presentationml/2006/main">
+  <p:cSld>
+    <p:spTree>
+      <p:nvGrpSpPr>
+        <p:cNvPr id="1" name=""/>
+        <p:cNvGrpSpPr/>
+        <p:nvPr/>
+      </p:nvGrpSpPr>
+      <p:grpSpPr>
+        <a:xfrm>
+          <a:off x="0" y="0"/>
+          <a:ext cx="0" cy="0"/>
+          <a:chOff x="0" y="0"/>
+          <a:chExt cx="0" cy="0"/>
+        </a:xfrm>
+      </p:grpSpPr>
+      <p:pic>
+        <p:nvPicPr>
+          <p:cNvPr id="4" name="Picture 3"/>
+          <p:cNvPicPr>
+            <a:picLocks noChangeAspect="1"/>
+          </p:cNvPicPr>
+          <p:nvPr/>
+        </p:nvPicPr>
+        <p:blipFill rotWithShape="1">
+          <a:blip r:embed="rId2"/>
+          <a:srcRect l="14001" t="17556" r="50890" b="35333"/>
+          <a:stretch/>
+        </p:blipFill>
+        <p:spPr>
+          <a:xfrm>
+            <a:off x="0" y="2331721"/>
+            <a:ext cx="3987800" cy="3009928"/>
+          </a:xfrm>
+          <a:prstGeom prst="rect">
+            <a:avLst/>
+          </a:prstGeom>
+        </p:spPr>
+      </p:pic>
+      <p:sp>
+        <p:nvSpPr>
+          <p:cNvPr id="5" name="TextBox 4"/>
+          <p:cNvSpPr txBox="1"/>
+          <p:nvPr/>
+        </p:nvSpPr>
+        <p:spPr>
+          <a:xfrm>
+            <a:off x="746760" y="670560"/>
+            <a:ext cx="10153036" cy="923330"/>
+          </a:xfrm>
+          <a:prstGeom prst="rect">
+            <a:avLst/>
+          </a:prstGeom>
+          <a:noFill/>
+        </p:spPr>
+        <p:txBody>
+          <a:bodyPr wrap="none" rtlCol="0">
+            <a:spAutoFit/>
+          </a:bodyPr>
+          <a:lstStyle/>
+          <a:p>
+            <a:r>
+              <a:rPr lang="en-GB" dirty="0" smtClean="0"/>
+              <a:t>Study 2</a:t>
+            </a:r>
+          </a:p>
+          <a:p>
+            <a:endParaRPr lang="en-GB" dirty="0"/>
+          </a:p>
+          <a:p>
+            <a:r>
+              <a:rPr lang="en-GB" dirty="0" smtClean="0"/>
+              <a:t>(Study 1 takes a long time to run and get a new figure, but it looks exactly the same. Near-perfect recovery)</a:t>
+            </a:r>
+            <a:endParaRPr lang="en-GB" dirty="0"/>
+          </a:p>
+        </p:txBody>
+      </p:sp>
+      <p:pic>
+        <p:nvPicPr>
+          <p:cNvPr id="6" name="Picture 5"/>
+          <p:cNvPicPr>
+            <a:picLocks noChangeAspect="1"/>
+          </p:cNvPicPr>
+          <p:nvPr/>
+        </p:nvPicPr>
+        <p:blipFill rotWithShape="1">
+          <a:blip r:embed="rId3"/>
+          <a:srcRect l="10278" t="18149" r="10556" b="38889"/>
+          <a:stretch/>
+        </p:blipFill>
+        <p:spPr>
+          <a:xfrm>
+            <a:off x="3871312" y="2616200"/>
+            <a:ext cx="8320688" cy="2540000"/>
+          </a:xfrm>
+          <a:prstGeom prst="rect">
+            <a:avLst/>
+          </a:prstGeom>
+        </p:spPr>
+      </p:pic>
+    </p:spTree>
+    <p:extLst>
+      <p:ext uri="{BB962C8B-B14F-4D97-AF65-F5344CB8AC3E}">
+        <p14:creationId xmlns:p14="http://schemas.microsoft.com/office/powerpoint/2010/main" val="1479690103"/>
       </p:ext>
     </p:extLst>
   </p:cSld>
@@ -3704,8 +5206,14 @@
           <p:nvPr/>
         </p:nvPicPr>
         <p:blipFill rotWithShape="1">
-          <a:blip r:embed="rId2"/>
-          <a:srcRect l="24583" t="14074" r="42813" b="38888"/>
+          <a:blip r:embed="rId2" cstate="email">
+            <a:extLst>
+              <a:ext uri="{28A0092B-C50C-407E-A947-70E740481C1C}">
+                <a14:useLocalDpi xmlns:a14="http://schemas.microsoft.com/office/drawing/2010/main"/>
+              </a:ext>
+            </a:extLst>
+          </a:blip>
+          <a:srcRect/>
           <a:stretch/>
         </p:blipFill>
         <p:spPr>
@@ -3765,8 +5273,14 @@
           <p:nvPr/>
         </p:nvPicPr>
         <p:blipFill rotWithShape="1">
-          <a:blip r:embed="rId3"/>
-          <a:srcRect l="4792" t="14629" r="62708" b="38148"/>
+          <a:blip r:embed="rId3" cstate="email">
+            <a:extLst>
+              <a:ext uri="{28A0092B-C50C-407E-A947-70E740481C1C}">
+                <a14:useLocalDpi xmlns:a14="http://schemas.microsoft.com/office/drawing/2010/main"/>
+              </a:ext>
+            </a:extLst>
+          </a:blip>
+          <a:srcRect/>
           <a:stretch/>
         </p:blipFill>
         <p:spPr>
@@ -3856,14 +5370,14 @@
           <p:nvPr/>
         </p:nvPicPr>
         <p:blipFill rotWithShape="1">
-          <a:blip r:embed="rId2">
+          <a:blip r:embed="rId2" cstate="email">
             <a:extLst>
               <a:ext uri="{28A0092B-C50C-407E-A947-70E740481C1C}">
-                <a14:useLocalDpi xmlns:a14="http://schemas.microsoft.com/office/drawing/2010/main" val="0"/>
+                <a14:useLocalDpi xmlns:a14="http://schemas.microsoft.com/office/drawing/2010/main"/>
               </a:ext>
             </a:extLst>
           </a:blip>
-          <a:srcRect l="2125" t="8667" r="3875" b="10000"/>
+          <a:srcRect/>
           <a:stretch/>
         </p:blipFill>
         <p:spPr>
@@ -3915,8 +5429,14 @@
           <p:nvPr/>
         </p:nvPicPr>
         <p:blipFill rotWithShape="1">
-          <a:blip r:embed="rId2"/>
-          <a:srcRect l="25521" t="13519" r="4167" b="40000"/>
+          <a:blip r:embed="rId2" cstate="email">
+            <a:extLst>
+              <a:ext uri="{28A0092B-C50C-407E-A947-70E740481C1C}">
+                <a14:useLocalDpi xmlns:a14="http://schemas.microsoft.com/office/drawing/2010/main"/>
+              </a:ext>
+            </a:extLst>
+          </a:blip>
+          <a:srcRect/>
           <a:stretch/>
         </p:blipFill>
         <p:spPr>
@@ -4032,14 +5552,14 @@
           <p:nvPr/>
         </p:nvPicPr>
         <p:blipFill rotWithShape="1">
-          <a:blip r:embed="rId2">
+          <a:blip r:embed="rId2" cstate="email">
             <a:extLst>
               <a:ext uri="{28A0092B-C50C-407E-A947-70E740481C1C}">
-                <a14:useLocalDpi xmlns:a14="http://schemas.microsoft.com/office/drawing/2010/main" val="0"/>
+                <a14:useLocalDpi xmlns:a14="http://schemas.microsoft.com/office/drawing/2010/main"/>
               </a:ext>
             </a:extLst>
           </a:blip>
-          <a:srcRect t="4889" b="18667"/>
+          <a:srcRect/>
           <a:stretch/>
         </p:blipFill>
         <p:spPr>
@@ -4091,8 +5611,14 @@
           <p:nvPr/>
         </p:nvPicPr>
         <p:blipFill rotWithShape="1">
-          <a:blip r:embed="rId2"/>
-          <a:srcRect l="30313" t="36852" r="51771" b="39444"/>
+          <a:blip r:embed="rId2" cstate="email">
+            <a:extLst>
+              <a:ext uri="{28A0092B-C50C-407E-A947-70E740481C1C}">
+                <a14:useLocalDpi xmlns:a14="http://schemas.microsoft.com/office/drawing/2010/main"/>
+              </a:ext>
+            </a:extLst>
+          </a:blip>
+          <a:srcRect/>
           <a:stretch/>
         </p:blipFill>
         <p:spPr>
@@ -4114,8 +5640,14 @@
           <p:nvPr/>
         </p:nvPicPr>
         <p:blipFill rotWithShape="1">
-          <a:blip r:embed="rId3"/>
-          <a:srcRect l="29166" t="44815" r="53125" b="31111"/>
+          <a:blip r:embed="rId3" cstate="email">
+            <a:extLst>
+              <a:ext uri="{28A0092B-C50C-407E-A947-70E740481C1C}">
+                <a14:useLocalDpi xmlns:a14="http://schemas.microsoft.com/office/drawing/2010/main"/>
+              </a:ext>
+            </a:extLst>
+          </a:blip>
+          <a:srcRect/>
           <a:stretch/>
         </p:blipFill>
         <p:spPr>
@@ -4231,14 +5763,14 @@
           <p:nvPr/>
         </p:nvPicPr>
         <p:blipFill rotWithShape="1">
-          <a:blip r:embed="rId2">
+          <a:blip r:embed="rId2" cstate="email">
             <a:extLst>
               <a:ext uri="{28A0092B-C50C-407E-A947-70E740481C1C}">
-                <a14:useLocalDpi xmlns:a14="http://schemas.microsoft.com/office/drawing/2010/main" val="0"/>
+                <a14:useLocalDpi xmlns:a14="http://schemas.microsoft.com/office/drawing/2010/main"/>
               </a:ext>
             </a:extLst>
           </a:blip>
-          <a:srcRect l="2000" t="3777" r="2251" b="21111"/>
+          <a:srcRect/>
           <a:stretch/>
         </p:blipFill>
         <p:spPr>
@@ -4322,8 +5854,14 @@
           <p:nvPr/>
         </p:nvPicPr>
         <p:blipFill rotWithShape="1">
-          <a:blip r:embed="rId2"/>
-          <a:srcRect l="56771" t="18519" r="10208" b="35370"/>
+          <a:blip r:embed="rId2" cstate="email">
+            <a:extLst>
+              <a:ext uri="{28A0092B-C50C-407E-A947-70E740481C1C}">
+                <a14:useLocalDpi xmlns:a14="http://schemas.microsoft.com/office/drawing/2010/main"/>
+              </a:ext>
+            </a:extLst>
+          </a:blip>
+          <a:srcRect/>
           <a:stretch/>
         </p:blipFill>
         <p:spPr>
@@ -4345,8 +5883,14 @@
           <p:nvPr/>
         </p:nvPicPr>
         <p:blipFill rotWithShape="1">
-          <a:blip r:embed="rId2"/>
-          <a:srcRect l="19479" t="18519" r="46250" b="35370"/>
+          <a:blip r:embed="rId3" cstate="email">
+            <a:extLst>
+              <a:ext uri="{28A0092B-C50C-407E-A947-70E740481C1C}">
+                <a14:useLocalDpi xmlns:a14="http://schemas.microsoft.com/office/drawing/2010/main"/>
+              </a:ext>
+            </a:extLst>
+          </a:blip>
+          <a:srcRect/>
           <a:stretch/>
         </p:blipFill>
         <p:spPr>

</xml_diff>

<commit_message>
simplified study 2 also, but split fit less than expected
</commit_message>
<xml_diff>
--- a/forensic_beads_some_slides/forensic_beads.pptx
+++ b/forensic_beads_some_slides/forensic_beads.pptx
@@ -29,6 +29,9 @@
     <p:sldId id="273" r:id="rId23"/>
     <p:sldId id="279" r:id="rId24"/>
     <p:sldId id="278" r:id="rId25"/>
+    <p:sldId id="280" r:id="rId26"/>
+    <p:sldId id="281" r:id="rId27"/>
+    <p:sldId id="282" r:id="rId28"/>
   </p:sldIdLst>
   <p:sldSz cx="12192000" cy="6858000"/>
   <p:notesSz cx="6858000" cy="9144000"/>
@@ -164,6 +167,9 @@
             <p14:sldId id="273"/>
             <p14:sldId id="279"/>
             <p14:sldId id="278"/>
+            <p14:sldId id="280"/>
+            <p14:sldId id="281"/>
+            <p14:sldId id="282"/>
           </p14:sldIdLst>
         </p14:section>
       </p14:sectionLst>
@@ -306,7 +312,7 @@
           <a:p>
             <a:fld id="{2700C6BD-C0EF-422F-A3C6-08FCE5AFE907}" type="datetimeFigureOut">
               <a:rPr lang="en-GB" smtClean="0"/>
-              <a:t>22/09/2023</a:t>
+              <a:t>01/10/2023</a:t>
             </a:fld>
             <a:endParaRPr lang="en-GB"/>
           </a:p>
@@ -476,7 +482,7 @@
           <a:p>
             <a:fld id="{2700C6BD-C0EF-422F-A3C6-08FCE5AFE907}" type="datetimeFigureOut">
               <a:rPr lang="en-GB" smtClean="0"/>
-              <a:t>22/09/2023</a:t>
+              <a:t>01/10/2023</a:t>
             </a:fld>
             <a:endParaRPr lang="en-GB"/>
           </a:p>
@@ -656,7 +662,7 @@
           <a:p>
             <a:fld id="{2700C6BD-C0EF-422F-A3C6-08FCE5AFE907}" type="datetimeFigureOut">
               <a:rPr lang="en-GB" smtClean="0"/>
-              <a:t>22/09/2023</a:t>
+              <a:t>01/10/2023</a:t>
             </a:fld>
             <a:endParaRPr lang="en-GB"/>
           </a:p>
@@ -826,7 +832,7 @@
           <a:p>
             <a:fld id="{2700C6BD-C0EF-422F-A3C6-08FCE5AFE907}" type="datetimeFigureOut">
               <a:rPr lang="en-GB" smtClean="0"/>
-              <a:t>22/09/2023</a:t>
+              <a:t>01/10/2023</a:t>
             </a:fld>
             <a:endParaRPr lang="en-GB"/>
           </a:p>
@@ -1072,7 +1078,7 @@
           <a:p>
             <a:fld id="{2700C6BD-C0EF-422F-A3C6-08FCE5AFE907}" type="datetimeFigureOut">
               <a:rPr lang="en-GB" smtClean="0"/>
-              <a:t>22/09/2023</a:t>
+              <a:t>01/10/2023</a:t>
             </a:fld>
             <a:endParaRPr lang="en-GB"/>
           </a:p>
@@ -1304,7 +1310,7 @@
           <a:p>
             <a:fld id="{2700C6BD-C0EF-422F-A3C6-08FCE5AFE907}" type="datetimeFigureOut">
               <a:rPr lang="en-GB" smtClean="0"/>
-              <a:t>22/09/2023</a:t>
+              <a:t>01/10/2023</a:t>
             </a:fld>
             <a:endParaRPr lang="en-GB"/>
           </a:p>
@@ -1671,7 +1677,7 @@
           <a:p>
             <a:fld id="{2700C6BD-C0EF-422F-A3C6-08FCE5AFE907}" type="datetimeFigureOut">
               <a:rPr lang="en-GB" smtClean="0"/>
-              <a:t>22/09/2023</a:t>
+              <a:t>01/10/2023</a:t>
             </a:fld>
             <a:endParaRPr lang="en-GB"/>
           </a:p>
@@ -1789,7 +1795,7 @@
           <a:p>
             <a:fld id="{2700C6BD-C0EF-422F-A3C6-08FCE5AFE907}" type="datetimeFigureOut">
               <a:rPr lang="en-GB" smtClean="0"/>
-              <a:t>22/09/2023</a:t>
+              <a:t>01/10/2023</a:t>
             </a:fld>
             <a:endParaRPr lang="en-GB"/>
           </a:p>
@@ -1884,7 +1890,7 @@
           <a:p>
             <a:fld id="{2700C6BD-C0EF-422F-A3C6-08FCE5AFE907}" type="datetimeFigureOut">
               <a:rPr lang="en-GB" smtClean="0"/>
-              <a:t>22/09/2023</a:t>
+              <a:t>01/10/2023</a:t>
             </a:fld>
             <a:endParaRPr lang="en-GB"/>
           </a:p>
@@ -2161,7 +2167,7 @@
           <a:p>
             <a:fld id="{2700C6BD-C0EF-422F-A3C6-08FCE5AFE907}" type="datetimeFigureOut">
               <a:rPr lang="en-GB" smtClean="0"/>
-              <a:t>22/09/2023</a:t>
+              <a:t>01/10/2023</a:t>
             </a:fld>
             <a:endParaRPr lang="en-GB"/>
           </a:p>
@@ -2414,7 +2420,7 @@
           <a:p>
             <a:fld id="{2700C6BD-C0EF-422F-A3C6-08FCE5AFE907}" type="datetimeFigureOut">
               <a:rPr lang="en-GB" smtClean="0"/>
-              <a:t>22/09/2023</a:t>
+              <a:t>01/10/2023</a:t>
             </a:fld>
             <a:endParaRPr lang="en-GB"/>
           </a:p>
@@ -2627,7 +2633,7 @@
           <a:p>
             <a:fld id="{2700C6BD-C0EF-422F-A3C6-08FCE5AFE907}" type="datetimeFigureOut">
               <a:rPr lang="en-GB" smtClean="0"/>
-              <a:t>22/09/2023</a:t>
+              <a:t>01/10/2023</a:t>
             </a:fld>
             <a:endParaRPr lang="en-GB"/>
           </a:p>
@@ -5180,6 +5186,195 @@
 </p:sld>
 </file>
 
+<file path=ppt/slides/slide25.xml><?xml version="1.0" encoding="utf-8"?>
+<p:sld xmlns:a="http://schemas.openxmlformats.org/drawingml/2006/main" xmlns:r="http://schemas.openxmlformats.org/officeDocument/2006/relationships" xmlns:p="http://schemas.openxmlformats.org/presentationml/2006/main">
+  <p:cSld>
+    <p:spTree>
+      <p:nvGrpSpPr>
+        <p:cNvPr id="1" name=""/>
+        <p:cNvGrpSpPr/>
+        <p:nvPr/>
+      </p:nvGrpSpPr>
+      <p:grpSpPr>
+        <a:xfrm>
+          <a:off x="0" y="0"/>
+          <a:ext cx="0" cy="0"/>
+          <a:chOff x="0" y="0"/>
+          <a:chExt cx="0" cy="0"/>
+        </a:xfrm>
+      </p:grpSpPr>
+      <p:pic>
+        <p:nvPicPr>
+          <p:cNvPr id="6" name="Picture 5"/>
+          <p:cNvPicPr>
+            <a:picLocks noChangeAspect="1"/>
+          </p:cNvPicPr>
+          <p:nvPr/>
+        </p:nvPicPr>
+        <p:blipFill rotWithShape="1">
+          <a:blip r:embed="rId2"/>
+          <a:srcRect l="33334" t="13333" r="32500" b="39259"/>
+          <a:stretch/>
+        </p:blipFill>
+        <p:spPr>
+          <a:xfrm>
+            <a:off x="781050" y="1352550"/>
+            <a:ext cx="6248400" cy="4876800"/>
+          </a:xfrm>
+          <a:prstGeom prst="rect">
+            <a:avLst/>
+          </a:prstGeom>
+        </p:spPr>
+      </p:pic>
+    </p:spTree>
+    <p:extLst>
+      <p:ext uri="{BB962C8B-B14F-4D97-AF65-F5344CB8AC3E}">
+        <p14:creationId xmlns:p14="http://schemas.microsoft.com/office/powerpoint/2010/main" val="1608846216"/>
+      </p:ext>
+    </p:extLst>
+  </p:cSld>
+  <p:clrMapOvr>
+    <a:masterClrMapping/>
+  </p:clrMapOvr>
+</p:sld>
+</file>
+
+<file path=ppt/slides/slide26.xml><?xml version="1.0" encoding="utf-8"?>
+<p:sld xmlns:a="http://schemas.openxmlformats.org/drawingml/2006/main" xmlns:r="http://schemas.openxmlformats.org/officeDocument/2006/relationships" xmlns:p="http://schemas.openxmlformats.org/presentationml/2006/main">
+  <p:cSld>
+    <p:spTree>
+      <p:nvGrpSpPr>
+        <p:cNvPr id="1" name=""/>
+        <p:cNvGrpSpPr/>
+        <p:nvPr/>
+      </p:nvGrpSpPr>
+      <p:grpSpPr>
+        <a:xfrm>
+          <a:off x="0" y="0"/>
+          <a:ext cx="0" cy="0"/>
+          <a:chOff x="0" y="0"/>
+          <a:chExt cx="0" cy="0"/>
+        </a:xfrm>
+      </p:grpSpPr>
+      <p:pic>
+        <p:nvPicPr>
+          <p:cNvPr id="4" name="Picture 3"/>
+          <p:cNvPicPr>
+            <a:picLocks noChangeAspect="1"/>
+          </p:cNvPicPr>
+          <p:nvPr/>
+        </p:nvPicPr>
+        <p:blipFill rotWithShape="1">
+          <a:blip r:embed="rId2"/>
+          <a:srcRect l="8437" t="17407" r="21667" b="35556"/>
+          <a:stretch/>
+        </p:blipFill>
+        <p:spPr>
+          <a:xfrm>
+            <a:off x="304800" y="2019300"/>
+            <a:ext cx="11625075" cy="4400550"/>
+          </a:xfrm>
+          <a:prstGeom prst="rect">
+            <a:avLst/>
+          </a:prstGeom>
+        </p:spPr>
+      </p:pic>
+      <p:sp>
+        <p:nvSpPr>
+          <p:cNvPr id="5" name="TextBox 4"/>
+          <p:cNvSpPr txBox="1"/>
+          <p:nvPr/>
+        </p:nvSpPr>
+        <p:spPr>
+          <a:xfrm>
+            <a:off x="628650" y="685800"/>
+            <a:ext cx="7255897" cy="369332"/>
+          </a:xfrm>
+          <a:prstGeom prst="rect">
+            <a:avLst/>
+          </a:prstGeom>
+          <a:noFill/>
+        </p:spPr>
+        <p:txBody>
+          <a:bodyPr wrap="none" rtlCol="0">
+            <a:spAutoFit/>
+          </a:bodyPr>
+          <a:lstStyle/>
+          <a:p>
+            <a:r>
+              <a:rPr lang="en-GB" dirty="0" smtClean="0"/>
+              <a:t>Small test run for parameter recovery with added response noise in Study 1</a:t>
+            </a:r>
+            <a:endParaRPr lang="en-GB" dirty="0"/>
+          </a:p>
+        </p:txBody>
+      </p:sp>
+    </p:spTree>
+    <p:extLst>
+      <p:ext uri="{BB962C8B-B14F-4D97-AF65-F5344CB8AC3E}">
+        <p14:creationId xmlns:p14="http://schemas.microsoft.com/office/powerpoint/2010/main" val="1279453807"/>
+      </p:ext>
+    </p:extLst>
+  </p:cSld>
+  <p:clrMapOvr>
+    <a:masterClrMapping/>
+  </p:clrMapOvr>
+</p:sld>
+</file>
+
+<file path=ppt/slides/slide27.xml><?xml version="1.0" encoding="utf-8"?>
+<p:sld xmlns:a="http://schemas.openxmlformats.org/drawingml/2006/main" xmlns:r="http://schemas.openxmlformats.org/officeDocument/2006/relationships" xmlns:p="http://schemas.openxmlformats.org/presentationml/2006/main">
+  <p:cSld>
+    <p:spTree>
+      <p:nvGrpSpPr>
+        <p:cNvPr id="1" name=""/>
+        <p:cNvGrpSpPr/>
+        <p:nvPr/>
+      </p:nvGrpSpPr>
+      <p:grpSpPr>
+        <a:xfrm>
+          <a:off x="0" y="0"/>
+          <a:ext cx="0" cy="0"/>
+          <a:chOff x="0" y="0"/>
+          <a:chExt cx="0" cy="0"/>
+        </a:xfrm>
+      </p:grpSpPr>
+      <p:pic>
+        <p:nvPicPr>
+          <p:cNvPr id="4" name="Picture 3"/>
+          <p:cNvPicPr>
+            <a:picLocks noChangeAspect="1"/>
+          </p:cNvPicPr>
+          <p:nvPr/>
+        </p:nvPicPr>
+        <p:blipFill rotWithShape="1">
+          <a:blip r:embed="rId2"/>
+          <a:srcRect l="2084" t="18148" r="12083" b="38704"/>
+          <a:stretch/>
+        </p:blipFill>
+        <p:spPr>
+          <a:xfrm>
+            <a:off x="0" y="1581150"/>
+            <a:ext cx="12192000" cy="3447495"/>
+          </a:xfrm>
+          <a:prstGeom prst="rect">
+            <a:avLst/>
+          </a:prstGeom>
+        </p:spPr>
+      </p:pic>
+    </p:spTree>
+    <p:extLst>
+      <p:ext uri="{BB962C8B-B14F-4D97-AF65-F5344CB8AC3E}">
+        <p14:creationId xmlns:p14="http://schemas.microsoft.com/office/powerpoint/2010/main" val="600787547"/>
+      </p:ext>
+    </p:extLst>
+  </p:cSld>
+  <p:clrMapOvr>
+    <a:masterClrMapping/>
+  </p:clrMapOvr>
+</p:sld>
+</file>
+
 <file path=ppt/slides/slide3.xml><?xml version="1.0" encoding="utf-8"?>
 <p:sld xmlns:a="http://schemas.openxmlformats.org/drawingml/2006/main" xmlns:r="http://schemas.openxmlformats.org/officeDocument/2006/relationships" xmlns:p="http://schemas.openxmlformats.org/presentationml/2006/main">
   <p:cSld>

</xml_diff>

<commit_message>
finished study 2 (w/n parts) param recovery and simplification
</commit_message>
<xml_diff>
--- a/forensic_beads_some_slides/forensic_beads.pptx
+++ b/forensic_beads_some_slides/forensic_beads.pptx
@@ -30,8 +30,10 @@
     <p:sldId id="279" r:id="rId24"/>
     <p:sldId id="278" r:id="rId25"/>
     <p:sldId id="280" r:id="rId26"/>
-    <p:sldId id="281" r:id="rId27"/>
-    <p:sldId id="282" r:id="rId28"/>
+    <p:sldId id="282" r:id="rId27"/>
+    <p:sldId id="283" r:id="rId28"/>
+    <p:sldId id="284" r:id="rId29"/>
+    <p:sldId id="285" r:id="rId30"/>
   </p:sldIdLst>
   <p:sldSz cx="12192000" cy="6858000"/>
   <p:notesSz cx="6858000" cy="9144000"/>
@@ -168,8 +170,10 @@
             <p14:sldId id="279"/>
             <p14:sldId id="278"/>
             <p14:sldId id="280"/>
-            <p14:sldId id="281"/>
             <p14:sldId id="282"/>
+            <p14:sldId id="283"/>
+            <p14:sldId id="284"/>
+            <p14:sldId id="285"/>
           </p14:sldIdLst>
         </p14:section>
       </p14:sectionLst>
@@ -312,7 +316,7 @@
           <a:p>
             <a:fld id="{2700C6BD-C0EF-422F-A3C6-08FCE5AFE907}" type="datetimeFigureOut">
               <a:rPr lang="en-GB" smtClean="0"/>
-              <a:t>01/10/2023</a:t>
+              <a:t>02/10/2023</a:t>
             </a:fld>
             <a:endParaRPr lang="en-GB"/>
           </a:p>
@@ -482,7 +486,7 @@
           <a:p>
             <a:fld id="{2700C6BD-C0EF-422F-A3C6-08FCE5AFE907}" type="datetimeFigureOut">
               <a:rPr lang="en-GB" smtClean="0"/>
-              <a:t>01/10/2023</a:t>
+              <a:t>02/10/2023</a:t>
             </a:fld>
             <a:endParaRPr lang="en-GB"/>
           </a:p>
@@ -662,7 +666,7 @@
           <a:p>
             <a:fld id="{2700C6BD-C0EF-422F-A3C6-08FCE5AFE907}" type="datetimeFigureOut">
               <a:rPr lang="en-GB" smtClean="0"/>
-              <a:t>01/10/2023</a:t>
+              <a:t>02/10/2023</a:t>
             </a:fld>
             <a:endParaRPr lang="en-GB"/>
           </a:p>
@@ -832,7 +836,7 @@
           <a:p>
             <a:fld id="{2700C6BD-C0EF-422F-A3C6-08FCE5AFE907}" type="datetimeFigureOut">
               <a:rPr lang="en-GB" smtClean="0"/>
-              <a:t>01/10/2023</a:t>
+              <a:t>02/10/2023</a:t>
             </a:fld>
             <a:endParaRPr lang="en-GB"/>
           </a:p>
@@ -1078,7 +1082,7 @@
           <a:p>
             <a:fld id="{2700C6BD-C0EF-422F-A3C6-08FCE5AFE907}" type="datetimeFigureOut">
               <a:rPr lang="en-GB" smtClean="0"/>
-              <a:t>01/10/2023</a:t>
+              <a:t>02/10/2023</a:t>
             </a:fld>
             <a:endParaRPr lang="en-GB"/>
           </a:p>
@@ -1310,7 +1314,7 @@
           <a:p>
             <a:fld id="{2700C6BD-C0EF-422F-A3C6-08FCE5AFE907}" type="datetimeFigureOut">
               <a:rPr lang="en-GB" smtClean="0"/>
-              <a:t>01/10/2023</a:t>
+              <a:t>02/10/2023</a:t>
             </a:fld>
             <a:endParaRPr lang="en-GB"/>
           </a:p>
@@ -1677,7 +1681,7 @@
           <a:p>
             <a:fld id="{2700C6BD-C0EF-422F-A3C6-08FCE5AFE907}" type="datetimeFigureOut">
               <a:rPr lang="en-GB" smtClean="0"/>
-              <a:t>01/10/2023</a:t>
+              <a:t>02/10/2023</a:t>
             </a:fld>
             <a:endParaRPr lang="en-GB"/>
           </a:p>
@@ -1795,7 +1799,7 @@
           <a:p>
             <a:fld id="{2700C6BD-C0EF-422F-A3C6-08FCE5AFE907}" type="datetimeFigureOut">
               <a:rPr lang="en-GB" smtClean="0"/>
-              <a:t>01/10/2023</a:t>
+              <a:t>02/10/2023</a:t>
             </a:fld>
             <a:endParaRPr lang="en-GB"/>
           </a:p>
@@ -1890,7 +1894,7 @@
           <a:p>
             <a:fld id="{2700C6BD-C0EF-422F-A3C6-08FCE5AFE907}" type="datetimeFigureOut">
               <a:rPr lang="en-GB" smtClean="0"/>
-              <a:t>01/10/2023</a:t>
+              <a:t>02/10/2023</a:t>
             </a:fld>
             <a:endParaRPr lang="en-GB"/>
           </a:p>
@@ -2167,7 +2171,7 @@
           <a:p>
             <a:fld id="{2700C6BD-C0EF-422F-A3C6-08FCE5AFE907}" type="datetimeFigureOut">
               <a:rPr lang="en-GB" smtClean="0"/>
-              <a:t>01/10/2023</a:t>
+              <a:t>02/10/2023</a:t>
             </a:fld>
             <a:endParaRPr lang="en-GB"/>
           </a:p>
@@ -2420,7 +2424,7 @@
           <a:p>
             <a:fld id="{2700C6BD-C0EF-422F-A3C6-08FCE5AFE907}" type="datetimeFigureOut">
               <a:rPr lang="en-GB" smtClean="0"/>
-              <a:t>01/10/2023</a:t>
+              <a:t>02/10/2023</a:t>
             </a:fld>
             <a:endParaRPr lang="en-GB"/>
           </a:p>
@@ -2633,7 +2637,7 @@
           <a:p>
             <a:fld id="{2700C6BD-C0EF-422F-A3C6-08FCE5AFE907}" type="datetimeFigureOut">
               <a:rPr lang="en-GB" smtClean="0"/>
-              <a:t>01/10/2023</a:t>
+              <a:t>02/10/2023</a:t>
             </a:fld>
             <a:endParaRPr lang="en-GB"/>
           </a:p>
@@ -5256,9 +5260,39 @@
           <a:chExt cx="0" cy="0"/>
         </a:xfrm>
       </p:grpSpPr>
+      <p:sp>
+        <p:nvSpPr>
+          <p:cNvPr id="2" name="TextBox 1"/>
+          <p:cNvSpPr txBox="1"/>
+          <p:nvPr/>
+        </p:nvSpPr>
+        <p:spPr>
+          <a:xfrm>
+            <a:off x="516835" y="503583"/>
+            <a:ext cx="938077" cy="369332"/>
+          </a:xfrm>
+          <a:prstGeom prst="rect">
+            <a:avLst/>
+          </a:prstGeom>
+          <a:noFill/>
+        </p:spPr>
+        <p:txBody>
+          <a:bodyPr wrap="none" rtlCol="0">
+            <a:spAutoFit/>
+          </a:bodyPr>
+          <a:lstStyle/>
+          <a:p>
+            <a:r>
+              <a:rPr lang="en-GB" dirty="0" smtClean="0"/>
+              <a:t>Study 1 </a:t>
+            </a:r>
+            <a:endParaRPr lang="en-GB" dirty="0"/>
+          </a:p>
+        </p:txBody>
+      </p:sp>
       <p:pic>
         <p:nvPicPr>
-          <p:cNvPr id="4" name="Picture 3"/>
+          <p:cNvPr id="5" name="Picture 4"/>
           <p:cNvPicPr>
             <a:picLocks noChangeAspect="1"/>
           </p:cNvPicPr>
@@ -5266,53 +5300,23 @@
         </p:nvPicPr>
         <p:blipFill rotWithShape="1">
           <a:blip r:embed="rId2"/>
-          <a:srcRect l="8437" t="17407" r="21667" b="35556"/>
+          <a:srcRect l="4063" t="26481" r="25832" b="27593"/>
           <a:stretch/>
         </p:blipFill>
         <p:spPr>
           <a:xfrm>
-            <a:off x="304800" y="2019300"/>
-            <a:ext cx="11625075" cy="4400550"/>
+            <a:off x="0" y="1158665"/>
+            <a:ext cx="12192000" cy="4492743"/>
           </a:xfrm>
           <a:prstGeom prst="rect">
             <a:avLst/>
           </a:prstGeom>
         </p:spPr>
       </p:pic>
-      <p:sp>
-        <p:nvSpPr>
-          <p:cNvPr id="5" name="TextBox 4"/>
-          <p:cNvSpPr txBox="1"/>
-          <p:nvPr/>
-        </p:nvSpPr>
-        <p:spPr>
-          <a:xfrm>
-            <a:off x="628650" y="685800"/>
-            <a:ext cx="7255897" cy="369332"/>
-          </a:xfrm>
-          <a:prstGeom prst="rect">
-            <a:avLst/>
-          </a:prstGeom>
-          <a:noFill/>
-        </p:spPr>
-        <p:txBody>
-          <a:bodyPr wrap="none" rtlCol="0">
-            <a:spAutoFit/>
-          </a:bodyPr>
-          <a:lstStyle/>
-          <a:p>
-            <a:r>
-              <a:rPr lang="en-GB" dirty="0" smtClean="0"/>
-              <a:t>Small test run for parameter recovery with added response noise in Study 1</a:t>
-            </a:r>
-            <a:endParaRPr lang="en-GB" dirty="0"/>
-          </a:p>
-        </p:txBody>
-      </p:sp>
     </p:spTree>
     <p:extLst>
       <p:ext uri="{BB962C8B-B14F-4D97-AF65-F5344CB8AC3E}">
-        <p14:creationId xmlns:p14="http://schemas.microsoft.com/office/powerpoint/2010/main" val="1279453807"/>
+        <p14:creationId xmlns:p14="http://schemas.microsoft.com/office/powerpoint/2010/main" val="600787547"/>
       </p:ext>
     </p:extLst>
   </p:cSld>
@@ -5339,9 +5343,39 @@
           <a:chExt cx="0" cy="0"/>
         </a:xfrm>
       </p:grpSpPr>
+      <p:sp>
+        <p:nvSpPr>
+          <p:cNvPr id="5" name="TextBox 4"/>
+          <p:cNvSpPr txBox="1"/>
+          <p:nvPr/>
+        </p:nvSpPr>
+        <p:spPr>
+          <a:xfrm>
+            <a:off x="247650" y="590550"/>
+            <a:ext cx="5821915" cy="369332"/>
+          </a:xfrm>
+          <a:prstGeom prst="rect">
+            <a:avLst/>
+          </a:prstGeom>
+          <a:noFill/>
+        </p:spPr>
+        <p:txBody>
+          <a:bodyPr wrap="none" rtlCol="0">
+            <a:spAutoFit/>
+          </a:bodyPr>
+          <a:lstStyle/>
+          <a:p>
+            <a:r>
+              <a:rPr lang="en-GB" dirty="0" smtClean="0"/>
+              <a:t>Study 2, four parameter (i.e., one suspect) model, small sim </a:t>
+            </a:r>
+            <a:endParaRPr lang="en-GB" dirty="0"/>
+          </a:p>
+        </p:txBody>
+      </p:sp>
       <p:pic>
         <p:nvPicPr>
-          <p:cNvPr id="4" name="Picture 3"/>
+          <p:cNvPr id="2" name="Picture 1"/>
           <p:cNvPicPr>
             <a:picLocks noChangeAspect="1"/>
           </p:cNvPicPr>
@@ -5349,13 +5383,13 @@
         </p:nvPicPr>
         <p:blipFill rotWithShape="1">
           <a:blip r:embed="rId2"/>
-          <a:srcRect l="2084" t="18148" r="12083" b="38704"/>
+          <a:srcRect l="3229" t="20000" r="25626" b="32963"/>
           <a:stretch/>
         </p:blipFill>
         <p:spPr>
           <a:xfrm>
-            <a:off x="0" y="1581150"/>
-            <a:ext cx="12192000" cy="3447495"/>
+            <a:off x="1" y="1409700"/>
+            <a:ext cx="12192000" cy="4534067"/>
           </a:xfrm>
           <a:prstGeom prst="rect">
             <a:avLst/>
@@ -5365,7 +5399,173 @@
     </p:spTree>
     <p:extLst>
       <p:ext uri="{BB962C8B-B14F-4D97-AF65-F5344CB8AC3E}">
-        <p14:creationId xmlns:p14="http://schemas.microsoft.com/office/powerpoint/2010/main" val="600787547"/>
+        <p14:creationId xmlns:p14="http://schemas.microsoft.com/office/powerpoint/2010/main" val="1156418832"/>
+      </p:ext>
+    </p:extLst>
+  </p:cSld>
+  <p:clrMapOvr>
+    <a:masterClrMapping/>
+  </p:clrMapOvr>
+</p:sld>
+</file>
+
+<file path=ppt/slides/slide28.xml><?xml version="1.0" encoding="utf-8"?>
+<p:sld xmlns:a="http://schemas.openxmlformats.org/drawingml/2006/main" xmlns:r="http://schemas.openxmlformats.org/officeDocument/2006/relationships" xmlns:p="http://schemas.openxmlformats.org/presentationml/2006/main">
+  <p:cSld>
+    <p:spTree>
+      <p:nvGrpSpPr>
+        <p:cNvPr id="1" name=""/>
+        <p:cNvGrpSpPr/>
+        <p:nvPr/>
+      </p:nvGrpSpPr>
+      <p:grpSpPr>
+        <a:xfrm>
+          <a:off x="0" y="0"/>
+          <a:ext cx="0" cy="0"/>
+          <a:chOff x="0" y="0"/>
+          <a:chExt cx="0" cy="0"/>
+        </a:xfrm>
+      </p:grpSpPr>
+      <p:pic>
+        <p:nvPicPr>
+          <p:cNvPr id="2" name="Picture 1"/>
+          <p:cNvPicPr>
+            <a:picLocks noChangeAspect="1"/>
+          </p:cNvPicPr>
+          <p:nvPr/>
+        </p:nvPicPr>
+        <p:blipFill rotWithShape="1">
+          <a:blip r:embed="rId2"/>
+          <a:srcRect l="24584" t="20371" r="4896" b="32222"/>
+          <a:stretch/>
+        </p:blipFill>
+        <p:spPr>
+          <a:xfrm>
+            <a:off x="0" y="1181100"/>
+            <a:ext cx="12192000" cy="4610269"/>
+          </a:xfrm>
+          <a:prstGeom prst="rect">
+            <a:avLst/>
+          </a:prstGeom>
+        </p:spPr>
+      </p:pic>
+      <p:sp>
+        <p:nvSpPr>
+          <p:cNvPr id="3" name="TextBox 2"/>
+          <p:cNvSpPr txBox="1"/>
+          <p:nvPr/>
+        </p:nvSpPr>
+        <p:spPr>
+          <a:xfrm>
+            <a:off x="247650" y="590550"/>
+            <a:ext cx="5919890" cy="369332"/>
+          </a:xfrm>
+          <a:prstGeom prst="rect">
+            <a:avLst/>
+          </a:prstGeom>
+          <a:noFill/>
+        </p:spPr>
+        <p:txBody>
+          <a:bodyPr wrap="none" rtlCol="0">
+            <a:spAutoFit/>
+          </a:bodyPr>
+          <a:lstStyle/>
+          <a:p>
+            <a:r>
+              <a:rPr lang="en-GB" dirty="0" smtClean="0"/>
+              <a:t>Study 2, four parameter (i.e., one suspect) model, bigger sim </a:t>
+            </a:r>
+            <a:endParaRPr lang="en-GB" dirty="0"/>
+          </a:p>
+        </p:txBody>
+      </p:sp>
+    </p:spTree>
+    <p:extLst>
+      <p:ext uri="{BB962C8B-B14F-4D97-AF65-F5344CB8AC3E}">
+        <p14:creationId xmlns:p14="http://schemas.microsoft.com/office/powerpoint/2010/main" val="1575908045"/>
+      </p:ext>
+    </p:extLst>
+  </p:cSld>
+  <p:clrMapOvr>
+    <a:masterClrMapping/>
+  </p:clrMapOvr>
+</p:sld>
+</file>
+
+<file path=ppt/slides/slide29.xml><?xml version="1.0" encoding="utf-8"?>
+<p:sld xmlns:a="http://schemas.openxmlformats.org/drawingml/2006/main" xmlns:r="http://schemas.openxmlformats.org/officeDocument/2006/relationships" xmlns:p="http://schemas.openxmlformats.org/presentationml/2006/main">
+  <p:cSld>
+    <p:spTree>
+      <p:nvGrpSpPr>
+        <p:cNvPr id="1" name=""/>
+        <p:cNvGrpSpPr/>
+        <p:nvPr/>
+      </p:nvGrpSpPr>
+      <p:grpSpPr>
+        <a:xfrm>
+          <a:off x="0" y="0"/>
+          <a:ext cx="0" cy="0"/>
+          <a:chOff x="0" y="0"/>
+          <a:chExt cx="0" cy="0"/>
+        </a:xfrm>
+      </p:grpSpPr>
+      <p:sp>
+        <p:nvSpPr>
+          <p:cNvPr id="5" name="TextBox 4"/>
+          <p:cNvSpPr txBox="1"/>
+          <p:nvPr/>
+        </p:nvSpPr>
+        <p:spPr>
+          <a:xfrm>
+            <a:off x="400050" y="438150"/>
+            <a:ext cx="4975336" cy="369332"/>
+          </a:xfrm>
+          <a:prstGeom prst="rect">
+            <a:avLst/>
+          </a:prstGeom>
+          <a:noFill/>
+        </p:spPr>
+        <p:txBody>
+          <a:bodyPr wrap="none" rtlCol="0">
+            <a:spAutoFit/>
+          </a:bodyPr>
+          <a:lstStyle/>
+          <a:p>
+            <a:r>
+              <a:rPr lang="en-GB" dirty="0" smtClean="0"/>
+              <a:t>Study 2 two prior, within/subjects model, small sim</a:t>
+            </a:r>
+            <a:endParaRPr lang="en-GB" dirty="0"/>
+          </a:p>
+        </p:txBody>
+      </p:sp>
+      <p:pic>
+        <p:nvPicPr>
+          <p:cNvPr id="7" name="Picture 6"/>
+          <p:cNvPicPr>
+            <a:picLocks noChangeAspect="1"/>
+          </p:cNvPicPr>
+          <p:nvPr/>
+        </p:nvPicPr>
+        <p:blipFill rotWithShape="1">
+          <a:blip r:embed="rId2"/>
+          <a:srcRect l="1042" t="17778" r="28958" b="35370"/>
+          <a:stretch/>
+        </p:blipFill>
+        <p:spPr>
+          <a:xfrm>
+            <a:off x="0" y="1143000"/>
+            <a:ext cx="12192000" cy="4590143"/>
+          </a:xfrm>
+          <a:prstGeom prst="rect">
+            <a:avLst/>
+          </a:prstGeom>
+        </p:spPr>
+      </p:pic>
+    </p:spTree>
+    <p:extLst>
+      <p:ext uri="{BB962C8B-B14F-4D97-AF65-F5344CB8AC3E}">
+        <p14:creationId xmlns:p14="http://schemas.microsoft.com/office/powerpoint/2010/main" val="1765757777"/>
       </p:ext>
     </p:extLst>
   </p:cSld>

</xml_diff>

<commit_message>
routine save - stuck at the moment
</commit_message>
<xml_diff>
--- a/forensic_beads_some_slides/forensic_beads.pptx
+++ b/forensic_beads_some_slides/forensic_beads.pptx
@@ -27,13 +27,11 @@
     <p:sldId id="271" r:id="rId21"/>
     <p:sldId id="272" r:id="rId22"/>
     <p:sldId id="273" r:id="rId23"/>
-    <p:sldId id="279" r:id="rId24"/>
-    <p:sldId id="278" r:id="rId25"/>
-    <p:sldId id="280" r:id="rId26"/>
-    <p:sldId id="282" r:id="rId27"/>
-    <p:sldId id="283" r:id="rId28"/>
-    <p:sldId id="284" r:id="rId29"/>
-    <p:sldId id="285" r:id="rId30"/>
+    <p:sldId id="286" r:id="rId24"/>
+    <p:sldId id="287" r:id="rId25"/>
+    <p:sldId id="282" r:id="rId26"/>
+    <p:sldId id="284" r:id="rId27"/>
+    <p:sldId id="285" r:id="rId28"/>
   </p:sldIdLst>
   <p:sldSz cx="12192000" cy="6858000"/>
   <p:notesSz cx="6858000" cy="9144000"/>
@@ -167,11 +165,9 @@
             <p14:sldId id="271"/>
             <p14:sldId id="272"/>
             <p14:sldId id="273"/>
-            <p14:sldId id="279"/>
-            <p14:sldId id="278"/>
-            <p14:sldId id="280"/>
+            <p14:sldId id="286"/>
+            <p14:sldId id="287"/>
             <p14:sldId id="282"/>
-            <p14:sldId id="283"/>
             <p14:sldId id="284"/>
             <p14:sldId id="285"/>
           </p14:sldIdLst>
@@ -316,7 +312,7 @@
           <a:p>
             <a:fld id="{2700C6BD-C0EF-422F-A3C6-08FCE5AFE907}" type="datetimeFigureOut">
               <a:rPr lang="en-GB" smtClean="0"/>
-              <a:t>02/10/2023</a:t>
+              <a:t>03/10/2023</a:t>
             </a:fld>
             <a:endParaRPr lang="en-GB"/>
           </a:p>
@@ -486,7 +482,7 @@
           <a:p>
             <a:fld id="{2700C6BD-C0EF-422F-A3C6-08FCE5AFE907}" type="datetimeFigureOut">
               <a:rPr lang="en-GB" smtClean="0"/>
-              <a:t>02/10/2023</a:t>
+              <a:t>03/10/2023</a:t>
             </a:fld>
             <a:endParaRPr lang="en-GB"/>
           </a:p>
@@ -666,7 +662,7 @@
           <a:p>
             <a:fld id="{2700C6BD-C0EF-422F-A3C6-08FCE5AFE907}" type="datetimeFigureOut">
               <a:rPr lang="en-GB" smtClean="0"/>
-              <a:t>02/10/2023</a:t>
+              <a:t>03/10/2023</a:t>
             </a:fld>
             <a:endParaRPr lang="en-GB"/>
           </a:p>
@@ -836,7 +832,7 @@
           <a:p>
             <a:fld id="{2700C6BD-C0EF-422F-A3C6-08FCE5AFE907}" type="datetimeFigureOut">
               <a:rPr lang="en-GB" smtClean="0"/>
-              <a:t>02/10/2023</a:t>
+              <a:t>03/10/2023</a:t>
             </a:fld>
             <a:endParaRPr lang="en-GB"/>
           </a:p>
@@ -1082,7 +1078,7 @@
           <a:p>
             <a:fld id="{2700C6BD-C0EF-422F-A3C6-08FCE5AFE907}" type="datetimeFigureOut">
               <a:rPr lang="en-GB" smtClean="0"/>
-              <a:t>02/10/2023</a:t>
+              <a:t>03/10/2023</a:t>
             </a:fld>
             <a:endParaRPr lang="en-GB"/>
           </a:p>
@@ -1314,7 +1310,7 @@
           <a:p>
             <a:fld id="{2700C6BD-C0EF-422F-A3C6-08FCE5AFE907}" type="datetimeFigureOut">
               <a:rPr lang="en-GB" smtClean="0"/>
-              <a:t>02/10/2023</a:t>
+              <a:t>03/10/2023</a:t>
             </a:fld>
             <a:endParaRPr lang="en-GB"/>
           </a:p>
@@ -1681,7 +1677,7 @@
           <a:p>
             <a:fld id="{2700C6BD-C0EF-422F-A3C6-08FCE5AFE907}" type="datetimeFigureOut">
               <a:rPr lang="en-GB" smtClean="0"/>
-              <a:t>02/10/2023</a:t>
+              <a:t>03/10/2023</a:t>
             </a:fld>
             <a:endParaRPr lang="en-GB"/>
           </a:p>
@@ -1799,7 +1795,7 @@
           <a:p>
             <a:fld id="{2700C6BD-C0EF-422F-A3C6-08FCE5AFE907}" type="datetimeFigureOut">
               <a:rPr lang="en-GB" smtClean="0"/>
-              <a:t>02/10/2023</a:t>
+              <a:t>03/10/2023</a:t>
             </a:fld>
             <a:endParaRPr lang="en-GB"/>
           </a:p>
@@ -1894,7 +1890,7 @@
           <a:p>
             <a:fld id="{2700C6BD-C0EF-422F-A3C6-08FCE5AFE907}" type="datetimeFigureOut">
               <a:rPr lang="en-GB" smtClean="0"/>
-              <a:t>02/10/2023</a:t>
+              <a:t>03/10/2023</a:t>
             </a:fld>
             <a:endParaRPr lang="en-GB"/>
           </a:p>
@@ -2171,7 +2167,7 @@
           <a:p>
             <a:fld id="{2700C6BD-C0EF-422F-A3C6-08FCE5AFE907}" type="datetimeFigureOut">
               <a:rPr lang="en-GB" smtClean="0"/>
-              <a:t>02/10/2023</a:t>
+              <a:t>03/10/2023</a:t>
             </a:fld>
             <a:endParaRPr lang="en-GB"/>
           </a:p>
@@ -2424,7 +2420,7 @@
           <a:p>
             <a:fld id="{2700C6BD-C0EF-422F-A3C6-08FCE5AFE907}" type="datetimeFigureOut">
               <a:rPr lang="en-GB" smtClean="0"/>
-              <a:t>02/10/2023</a:t>
+              <a:t>03/10/2023</a:t>
             </a:fld>
             <a:endParaRPr lang="en-GB"/>
           </a:p>
@@ -2637,7 +2633,7 @@
           <a:p>
             <a:fld id="{2700C6BD-C0EF-422F-A3C6-08FCE5AFE907}" type="datetimeFigureOut">
               <a:rPr lang="en-GB" smtClean="0"/>
-              <a:t>02/10/2023</a:t>
+              <a:t>03/10/2023</a:t>
             </a:fld>
             <a:endParaRPr lang="en-GB"/>
           </a:p>
@@ -5062,10 +5058,94 @@
           <a:chExt cx="0" cy="0"/>
         </a:xfrm>
       </p:grpSpPr>
+      <p:pic>
+        <p:nvPicPr>
+          <p:cNvPr id="4" name="Picture 3"/>
+          <p:cNvPicPr>
+            <a:picLocks noChangeAspect="1"/>
+          </p:cNvPicPr>
+          <p:nvPr/>
+        </p:nvPicPr>
+        <p:blipFill rotWithShape="1">
+          <a:blip r:embed="rId2"/>
+          <a:srcRect l="8667" t="16667" r="75000" b="36370"/>
+          <a:stretch/>
+        </p:blipFill>
+        <p:spPr>
+          <a:xfrm>
+            <a:off x="350520" y="1463040"/>
+            <a:ext cx="2987040" cy="4831080"/>
+          </a:xfrm>
+          <a:prstGeom prst="rect">
+            <a:avLst/>
+          </a:prstGeom>
+        </p:spPr>
+      </p:pic>
+      <p:sp>
+        <p:nvSpPr>
+          <p:cNvPr id="5" name="TextBox 4"/>
+          <p:cNvSpPr txBox="1"/>
+          <p:nvPr/>
+        </p:nvSpPr>
+        <p:spPr>
+          <a:xfrm>
+            <a:off x="579120" y="426720"/>
+            <a:ext cx="7236340" cy="369332"/>
+          </a:xfrm>
+          <a:prstGeom prst="rect">
+            <a:avLst/>
+          </a:prstGeom>
+          <a:noFill/>
+        </p:spPr>
+        <p:txBody>
+          <a:bodyPr wrap="none" rtlCol="0">
+            <a:spAutoFit/>
+          </a:bodyPr>
+          <a:lstStyle/>
+          <a:p>
+            <a:r>
+              <a:rPr lang="en-GB" dirty="0" smtClean="0"/>
+              <a:t>Study 2, separate four parameters for each suspect prior effect </a:t>
+            </a:r>
+            <a:r>
+              <a:rPr lang="en-GB" dirty="0" err="1" smtClean="0"/>
+              <a:t>n.s</a:t>
+            </a:r>
+            <a:r>
+              <a:rPr lang="en-GB" dirty="0" smtClean="0"/>
+              <a:t>. though)</a:t>
+            </a:r>
+            <a:endParaRPr lang="en-GB" dirty="0"/>
+          </a:p>
+        </p:txBody>
+      </p:sp>
+      <p:pic>
+        <p:nvPicPr>
+          <p:cNvPr id="6" name="Picture 5"/>
+          <p:cNvPicPr>
+            <a:picLocks noChangeAspect="1"/>
+          </p:cNvPicPr>
+          <p:nvPr/>
+        </p:nvPicPr>
+        <p:blipFill rotWithShape="1">
+          <a:blip r:embed="rId3"/>
+          <a:srcRect l="46416" t="18000" r="15917" b="14296"/>
+          <a:stretch/>
+        </p:blipFill>
+        <p:spPr>
+          <a:xfrm>
+            <a:off x="5029200" y="1070372"/>
+            <a:ext cx="5287181" cy="5345668"/>
+          </a:xfrm>
+          <a:prstGeom prst="rect">
+            <a:avLst/>
+          </a:prstGeom>
+        </p:spPr>
+      </p:pic>
     </p:spTree>
     <p:extLst>
       <p:ext uri="{BB962C8B-B14F-4D97-AF65-F5344CB8AC3E}">
-        <p14:creationId xmlns:p14="http://schemas.microsoft.com/office/powerpoint/2010/main" val="2881667403"/>
+        <p14:creationId xmlns:p14="http://schemas.microsoft.com/office/powerpoint/2010/main" val="2508002431"/>
       </p:ext>
     </p:extLst>
   </p:cSld>
@@ -5102,75 +5182,13 @@
         </p:nvPicPr>
         <p:blipFill rotWithShape="1">
           <a:blip r:embed="rId2"/>
-          <a:srcRect l="14001" t="17556" r="50890" b="35333"/>
+          <a:srcRect l="3917" t="16815" r="29750" b="35481"/>
           <a:stretch/>
         </p:blipFill>
         <p:spPr>
           <a:xfrm>
-            <a:off x="0" y="2331721"/>
-            <a:ext cx="3987800" cy="3009928"/>
-          </a:xfrm>
-          <a:prstGeom prst="rect">
-            <a:avLst/>
-          </a:prstGeom>
-        </p:spPr>
-      </p:pic>
-      <p:sp>
-        <p:nvSpPr>
-          <p:cNvPr id="5" name="TextBox 4"/>
-          <p:cNvSpPr txBox="1"/>
-          <p:nvPr/>
-        </p:nvSpPr>
-        <p:spPr>
-          <a:xfrm>
-            <a:off x="746760" y="670560"/>
-            <a:ext cx="10153036" cy="923330"/>
-          </a:xfrm>
-          <a:prstGeom prst="rect">
-            <a:avLst/>
-          </a:prstGeom>
-          <a:noFill/>
-        </p:spPr>
-        <p:txBody>
-          <a:bodyPr wrap="none" rtlCol="0">
-            <a:spAutoFit/>
-          </a:bodyPr>
-          <a:lstStyle/>
-          <a:p>
-            <a:r>
-              <a:rPr lang="en-GB" dirty="0" smtClean="0"/>
-              <a:t>Study 2</a:t>
-            </a:r>
-          </a:p>
-          <a:p>
-            <a:endParaRPr lang="en-GB" dirty="0"/>
-          </a:p>
-          <a:p>
-            <a:r>
-              <a:rPr lang="en-GB" dirty="0" smtClean="0"/>
-              <a:t>(Study 1 takes a long time to run and get a new figure, but it looks exactly the same. Near-perfect recovery)</a:t>
-            </a:r>
-            <a:endParaRPr lang="en-GB" dirty="0"/>
-          </a:p>
-        </p:txBody>
-      </p:sp>
-      <p:pic>
-        <p:nvPicPr>
-          <p:cNvPr id="6" name="Picture 5"/>
-          <p:cNvPicPr>
-            <a:picLocks noChangeAspect="1"/>
-          </p:cNvPicPr>
-          <p:nvPr/>
-        </p:nvPicPr>
-        <p:blipFill rotWithShape="1">
-          <a:blip r:embed="rId3"/>
-          <a:srcRect l="10278" t="18149" r="10556" b="38889"/>
-          <a:stretch/>
-        </p:blipFill>
-        <p:spPr>
-          <a:xfrm>
-            <a:off x="3871312" y="2616200"/>
-            <a:ext cx="8320688" cy="2540000"/>
+            <a:off x="60960" y="1158240"/>
+            <a:ext cx="12131040" cy="4907280"/>
           </a:xfrm>
           <a:prstGeom prst="rect">
             <a:avLst/>
@@ -5180,7 +5198,7 @@
     </p:spTree>
     <p:extLst>
       <p:ext uri="{BB962C8B-B14F-4D97-AF65-F5344CB8AC3E}">
-        <p14:creationId xmlns:p14="http://schemas.microsoft.com/office/powerpoint/2010/main" val="1479690103"/>
+        <p14:creationId xmlns:p14="http://schemas.microsoft.com/office/powerpoint/2010/main" val="1608204441"/>
       </p:ext>
     </p:extLst>
   </p:cSld>
@@ -5207,9 +5225,39 @@
           <a:chExt cx="0" cy="0"/>
         </a:xfrm>
       </p:grpSpPr>
+      <p:sp>
+        <p:nvSpPr>
+          <p:cNvPr id="2" name="TextBox 1"/>
+          <p:cNvSpPr txBox="1"/>
+          <p:nvPr/>
+        </p:nvSpPr>
+        <p:spPr>
+          <a:xfrm>
+            <a:off x="516835" y="503583"/>
+            <a:ext cx="938077" cy="369332"/>
+          </a:xfrm>
+          <a:prstGeom prst="rect">
+            <a:avLst/>
+          </a:prstGeom>
+          <a:noFill/>
+        </p:spPr>
+        <p:txBody>
+          <a:bodyPr wrap="none" rtlCol="0">
+            <a:spAutoFit/>
+          </a:bodyPr>
+          <a:lstStyle/>
+          <a:p>
+            <a:r>
+              <a:rPr lang="en-GB" dirty="0" smtClean="0"/>
+              <a:t>Study 1 </a:t>
+            </a:r>
+            <a:endParaRPr lang="en-GB" dirty="0"/>
+          </a:p>
+        </p:txBody>
+      </p:sp>
       <p:pic>
         <p:nvPicPr>
-          <p:cNvPr id="6" name="Picture 5"/>
+          <p:cNvPr id="5" name="Picture 4"/>
           <p:cNvPicPr>
             <a:picLocks noChangeAspect="1"/>
           </p:cNvPicPr>
@@ -5217,13 +5265,13 @@
         </p:nvPicPr>
         <p:blipFill rotWithShape="1">
           <a:blip r:embed="rId2"/>
-          <a:srcRect l="33334" t="13333" r="32500" b="39259"/>
+          <a:srcRect l="4063" t="26481" r="25832" b="27593"/>
           <a:stretch/>
         </p:blipFill>
         <p:spPr>
           <a:xfrm>
-            <a:off x="781050" y="1352550"/>
-            <a:ext cx="6248400" cy="4876800"/>
+            <a:off x="0" y="1158665"/>
+            <a:ext cx="12192000" cy="4492743"/>
           </a:xfrm>
           <a:prstGeom prst="rect">
             <a:avLst/>
@@ -5233,7 +5281,7 @@
     </p:spTree>
     <p:extLst>
       <p:ext uri="{BB962C8B-B14F-4D97-AF65-F5344CB8AC3E}">
-        <p14:creationId xmlns:p14="http://schemas.microsoft.com/office/powerpoint/2010/main" val="1608846216"/>
+        <p14:creationId xmlns:p14="http://schemas.microsoft.com/office/powerpoint/2010/main" val="600787547"/>
       </p:ext>
     </p:extLst>
   </p:cSld>
@@ -5260,172 +5308,6 @@
           <a:chExt cx="0" cy="0"/>
         </a:xfrm>
       </p:grpSpPr>
-      <p:sp>
-        <p:nvSpPr>
-          <p:cNvPr id="2" name="TextBox 1"/>
-          <p:cNvSpPr txBox="1"/>
-          <p:nvPr/>
-        </p:nvSpPr>
-        <p:spPr>
-          <a:xfrm>
-            <a:off x="516835" y="503583"/>
-            <a:ext cx="938077" cy="369332"/>
-          </a:xfrm>
-          <a:prstGeom prst="rect">
-            <a:avLst/>
-          </a:prstGeom>
-          <a:noFill/>
-        </p:spPr>
-        <p:txBody>
-          <a:bodyPr wrap="none" rtlCol="0">
-            <a:spAutoFit/>
-          </a:bodyPr>
-          <a:lstStyle/>
-          <a:p>
-            <a:r>
-              <a:rPr lang="en-GB" dirty="0" smtClean="0"/>
-              <a:t>Study 1 </a:t>
-            </a:r>
-            <a:endParaRPr lang="en-GB" dirty="0"/>
-          </a:p>
-        </p:txBody>
-      </p:sp>
-      <p:pic>
-        <p:nvPicPr>
-          <p:cNvPr id="5" name="Picture 4"/>
-          <p:cNvPicPr>
-            <a:picLocks noChangeAspect="1"/>
-          </p:cNvPicPr>
-          <p:nvPr/>
-        </p:nvPicPr>
-        <p:blipFill rotWithShape="1">
-          <a:blip r:embed="rId2"/>
-          <a:srcRect l="4063" t="26481" r="25832" b="27593"/>
-          <a:stretch/>
-        </p:blipFill>
-        <p:spPr>
-          <a:xfrm>
-            <a:off x="0" y="1158665"/>
-            <a:ext cx="12192000" cy="4492743"/>
-          </a:xfrm>
-          <a:prstGeom prst="rect">
-            <a:avLst/>
-          </a:prstGeom>
-        </p:spPr>
-      </p:pic>
-    </p:spTree>
-    <p:extLst>
-      <p:ext uri="{BB962C8B-B14F-4D97-AF65-F5344CB8AC3E}">
-        <p14:creationId xmlns:p14="http://schemas.microsoft.com/office/powerpoint/2010/main" val="600787547"/>
-      </p:ext>
-    </p:extLst>
-  </p:cSld>
-  <p:clrMapOvr>
-    <a:masterClrMapping/>
-  </p:clrMapOvr>
-</p:sld>
-</file>
-
-<file path=ppt/slides/slide27.xml><?xml version="1.0" encoding="utf-8"?>
-<p:sld xmlns:a="http://schemas.openxmlformats.org/drawingml/2006/main" xmlns:r="http://schemas.openxmlformats.org/officeDocument/2006/relationships" xmlns:p="http://schemas.openxmlformats.org/presentationml/2006/main">
-  <p:cSld>
-    <p:spTree>
-      <p:nvGrpSpPr>
-        <p:cNvPr id="1" name=""/>
-        <p:cNvGrpSpPr/>
-        <p:nvPr/>
-      </p:nvGrpSpPr>
-      <p:grpSpPr>
-        <a:xfrm>
-          <a:off x="0" y="0"/>
-          <a:ext cx="0" cy="0"/>
-          <a:chOff x="0" y="0"/>
-          <a:chExt cx="0" cy="0"/>
-        </a:xfrm>
-      </p:grpSpPr>
-      <p:sp>
-        <p:nvSpPr>
-          <p:cNvPr id="5" name="TextBox 4"/>
-          <p:cNvSpPr txBox="1"/>
-          <p:nvPr/>
-        </p:nvSpPr>
-        <p:spPr>
-          <a:xfrm>
-            <a:off x="247650" y="590550"/>
-            <a:ext cx="5821915" cy="369332"/>
-          </a:xfrm>
-          <a:prstGeom prst="rect">
-            <a:avLst/>
-          </a:prstGeom>
-          <a:noFill/>
-        </p:spPr>
-        <p:txBody>
-          <a:bodyPr wrap="none" rtlCol="0">
-            <a:spAutoFit/>
-          </a:bodyPr>
-          <a:lstStyle/>
-          <a:p>
-            <a:r>
-              <a:rPr lang="en-GB" dirty="0" smtClean="0"/>
-              <a:t>Study 2, four parameter (i.e., one suspect) model, small sim </a:t>
-            </a:r>
-            <a:endParaRPr lang="en-GB" dirty="0"/>
-          </a:p>
-        </p:txBody>
-      </p:sp>
-      <p:pic>
-        <p:nvPicPr>
-          <p:cNvPr id="2" name="Picture 1"/>
-          <p:cNvPicPr>
-            <a:picLocks noChangeAspect="1"/>
-          </p:cNvPicPr>
-          <p:nvPr/>
-        </p:nvPicPr>
-        <p:blipFill rotWithShape="1">
-          <a:blip r:embed="rId2"/>
-          <a:srcRect l="3229" t="20000" r="25626" b="32963"/>
-          <a:stretch/>
-        </p:blipFill>
-        <p:spPr>
-          <a:xfrm>
-            <a:off x="1" y="1409700"/>
-            <a:ext cx="12192000" cy="4534067"/>
-          </a:xfrm>
-          <a:prstGeom prst="rect">
-            <a:avLst/>
-          </a:prstGeom>
-        </p:spPr>
-      </p:pic>
-    </p:spTree>
-    <p:extLst>
-      <p:ext uri="{BB962C8B-B14F-4D97-AF65-F5344CB8AC3E}">
-        <p14:creationId xmlns:p14="http://schemas.microsoft.com/office/powerpoint/2010/main" val="1156418832"/>
-      </p:ext>
-    </p:extLst>
-  </p:cSld>
-  <p:clrMapOvr>
-    <a:masterClrMapping/>
-  </p:clrMapOvr>
-</p:sld>
-</file>
-
-<file path=ppt/slides/slide28.xml><?xml version="1.0" encoding="utf-8"?>
-<p:sld xmlns:a="http://schemas.openxmlformats.org/drawingml/2006/main" xmlns:r="http://schemas.openxmlformats.org/officeDocument/2006/relationships" xmlns:p="http://schemas.openxmlformats.org/presentationml/2006/main">
-  <p:cSld>
-    <p:spTree>
-      <p:nvGrpSpPr>
-        <p:cNvPr id="1" name=""/>
-        <p:cNvGrpSpPr/>
-        <p:nvPr/>
-      </p:nvGrpSpPr>
-      <p:grpSpPr>
-        <a:xfrm>
-          <a:off x="0" y="0"/>
-          <a:ext cx="0" cy="0"/>
-          <a:chOff x="0" y="0"/>
-          <a:chExt cx="0" cy="0"/>
-        </a:xfrm>
-      </p:grpSpPr>
       <p:pic>
         <p:nvPicPr>
           <p:cNvPr id="2" name="Picture 1"/>
@@ -5492,7 +5374,7 @@
 </p:sld>
 </file>
 
-<file path=ppt/slides/slide29.xml><?xml version="1.0" encoding="utf-8"?>
+<file path=ppt/slides/slide27.xml><?xml version="1.0" encoding="utf-8"?>
 <p:sld xmlns:a="http://schemas.openxmlformats.org/drawingml/2006/main" xmlns:r="http://schemas.openxmlformats.org/officeDocument/2006/relationships" xmlns:p="http://schemas.openxmlformats.org/presentationml/2006/main">
   <p:cSld>
     <p:spTree>

</xml_diff>